<commit_message>
updated powerpoint, added document for the script
</commit_message>
<xml_diff>
--- a/Presentation/Diederich_Grassi_Nichols_PPT.pptx
+++ b/Presentation/Diederich_Grassi_Nichols_PPT.pptx
@@ -202,7 +202,7 @@
           <a:p>
             <a:fld id="{25210F6A-C8B1-4A89-8624-1778A363FECB}" type="datetimeFigureOut">
               <a:rPr lang="en-US" smtClean="0"/>
-              <a:t>11/7/2017</a:t>
+              <a:t>11/8/2017</a:t>
             </a:fld>
             <a:endParaRPr lang="en-US"/>
           </a:p>
@@ -470,6 +470,90 @@
 </p:notesMaster>
 </file>
 
+<file path=ppt/notesSlides/notesSlide1.xml><?xml version="1.0" encoding="utf-8"?>
+<p:notes xmlns:a="http://schemas.openxmlformats.org/drawingml/2006/main" xmlns:r="http://schemas.openxmlformats.org/officeDocument/2006/relationships" xmlns:p="http://schemas.openxmlformats.org/presentationml/2006/main">
+  <p:cSld>
+    <p:spTree>
+      <p:nvGrpSpPr>
+        <p:cNvPr id="1" name=""/>
+        <p:cNvGrpSpPr/>
+        <p:nvPr/>
+      </p:nvGrpSpPr>
+      <p:grpSpPr>
+        <a:xfrm>
+          <a:off x="0" y="0"/>
+          <a:ext cx="0" cy="0"/>
+          <a:chOff x="0" y="0"/>
+          <a:chExt cx="0" cy="0"/>
+        </a:xfrm>
+      </p:grpSpPr>
+      <p:sp>
+        <p:nvSpPr>
+          <p:cNvPr id="2" name="Slide Image Placeholder 1"/>
+          <p:cNvSpPr>
+            <a:spLocks noGrp="1" noRot="1" noChangeAspect="1"/>
+          </p:cNvSpPr>
+          <p:nvPr>
+            <p:ph type="sldImg"/>
+          </p:nvPr>
+        </p:nvSpPr>
+        <p:spPr/>
+      </p:sp>
+      <p:sp>
+        <p:nvSpPr>
+          <p:cNvPr id="3" name="Notes Placeholder 2"/>
+          <p:cNvSpPr>
+            <a:spLocks noGrp="1"/>
+          </p:cNvSpPr>
+          <p:nvPr>
+            <p:ph type="body" idx="1"/>
+          </p:nvPr>
+        </p:nvSpPr>
+        <p:spPr/>
+        <p:txBody>
+          <a:bodyPr/>
+          <a:lstStyle/>
+          <a:p>
+            <a:endParaRPr lang="en-US" dirty="0"/>
+          </a:p>
+        </p:txBody>
+      </p:sp>
+      <p:sp>
+        <p:nvSpPr>
+          <p:cNvPr id="4" name="Slide Number Placeholder 3"/>
+          <p:cNvSpPr>
+            <a:spLocks noGrp="1"/>
+          </p:cNvSpPr>
+          <p:nvPr>
+            <p:ph type="sldNum" sz="quarter" idx="10"/>
+          </p:nvPr>
+        </p:nvSpPr>
+        <p:spPr/>
+        <p:txBody>
+          <a:bodyPr/>
+          <a:lstStyle/>
+          <a:p>
+            <a:fld id="{E9C93185-2FDD-4F2A-A3C1-F706A3C8E501}" type="slidenum">
+              <a:rPr lang="en-US" smtClean="0"/>
+              <a:t>3</a:t>
+            </a:fld>
+            <a:endParaRPr lang="en-US"/>
+          </a:p>
+        </p:txBody>
+      </p:sp>
+    </p:spTree>
+    <p:extLst>
+      <p:ext uri="{BB962C8B-B14F-4D97-AF65-F5344CB8AC3E}">
+        <p14:creationId xmlns:p14="http://schemas.microsoft.com/office/powerpoint/2010/main" val="1915447384"/>
+      </p:ext>
+    </p:extLst>
+  </p:cSld>
+  <p:clrMapOvr>
+    <a:masterClrMapping/>
+  </p:clrMapOvr>
+</p:notes>
+</file>
+
 <file path=ppt/slideLayouts/slideLayout1.xml><?xml version="1.0" encoding="utf-8"?>
 <p:sldLayout xmlns:a="http://schemas.openxmlformats.org/drawingml/2006/main" xmlns:r="http://schemas.openxmlformats.org/officeDocument/2006/relationships" xmlns:p="http://schemas.openxmlformats.org/presentationml/2006/main" preserve="1">
   <p:cSld name="Title Slide">
@@ -1580,7 +1664,7 @@
           <a:p>
             <a:fld id="{90455005-09FF-4243-A183-D1053D00688D}" type="datetimeFigureOut">
               <a:rPr lang="en-US" smtClean="0"/>
-              <a:t>11/7/2017</a:t>
+              <a:t>11/8/2017</a:t>
             </a:fld>
             <a:endParaRPr lang="en-US"/>
           </a:p>
@@ -1750,7 +1834,7 @@
           <a:p>
             <a:fld id="{90455005-09FF-4243-A183-D1053D00688D}" type="datetimeFigureOut">
               <a:rPr lang="en-US" smtClean="0"/>
-              <a:t>11/7/2017</a:t>
+              <a:t>11/8/2017</a:t>
             </a:fld>
             <a:endParaRPr lang="en-US"/>
           </a:p>
@@ -1996,7 +2080,7 @@
           <a:p>
             <a:fld id="{90455005-09FF-4243-A183-D1053D00688D}" type="datetimeFigureOut">
               <a:rPr lang="en-US" smtClean="0"/>
-              <a:t>11/7/2017</a:t>
+              <a:t>11/8/2017</a:t>
             </a:fld>
             <a:endParaRPr lang="en-US"/>
           </a:p>
@@ -2284,7 +2368,7 @@
           <a:p>
             <a:fld id="{90455005-09FF-4243-A183-D1053D00688D}" type="datetimeFigureOut">
               <a:rPr lang="en-US" smtClean="0"/>
-              <a:t>11/7/2017</a:t>
+              <a:t>11/8/2017</a:t>
             </a:fld>
             <a:endParaRPr lang="en-US"/>
           </a:p>
@@ -2706,7 +2790,7 @@
           <a:p>
             <a:fld id="{90455005-09FF-4243-A183-D1053D00688D}" type="datetimeFigureOut">
               <a:rPr lang="en-US" smtClean="0"/>
-              <a:t>11/7/2017</a:t>
+              <a:t>11/8/2017</a:t>
             </a:fld>
             <a:endParaRPr lang="en-US"/>
           </a:p>
@@ -2824,7 +2908,7 @@
           <a:p>
             <a:fld id="{90455005-09FF-4243-A183-D1053D00688D}" type="datetimeFigureOut">
               <a:rPr lang="en-US" smtClean="0"/>
-              <a:t>11/7/2017</a:t>
+              <a:t>11/8/2017</a:t>
             </a:fld>
             <a:endParaRPr lang="en-US"/>
           </a:p>
@@ -2919,7 +3003,7 @@
           <a:p>
             <a:fld id="{90455005-09FF-4243-A183-D1053D00688D}" type="datetimeFigureOut">
               <a:rPr lang="en-US" smtClean="0"/>
-              <a:t>11/7/2017</a:t>
+              <a:t>11/8/2017</a:t>
             </a:fld>
             <a:endParaRPr lang="en-US"/>
           </a:p>
@@ -3196,7 +3280,7 @@
           <a:p>
             <a:fld id="{90455005-09FF-4243-A183-D1053D00688D}" type="datetimeFigureOut">
               <a:rPr lang="en-US" smtClean="0"/>
-              <a:t>11/7/2017</a:t>
+              <a:t>11/8/2017</a:t>
             </a:fld>
             <a:endParaRPr lang="en-US"/>
           </a:p>
@@ -3562,7 +3646,7 @@
           <a:p>
             <a:fld id="{90455005-09FF-4243-A183-D1053D00688D}" type="datetimeFigureOut">
               <a:rPr lang="en-US" smtClean="0"/>
-              <a:t>11/7/2017</a:t>
+              <a:t>11/8/2017</a:t>
             </a:fld>
             <a:endParaRPr lang="en-US"/>
           </a:p>
@@ -3732,7 +3816,7 @@
           <a:p>
             <a:fld id="{90455005-09FF-4243-A183-D1053D00688D}" type="datetimeFigureOut">
               <a:rPr lang="en-US" smtClean="0"/>
-              <a:t>11/7/2017</a:t>
+              <a:t>11/8/2017</a:t>
             </a:fld>
             <a:endParaRPr lang="en-US"/>
           </a:p>
@@ -3912,7 +3996,7 @@
           <a:p>
             <a:fld id="{90455005-09FF-4243-A183-D1053D00688D}" type="datetimeFigureOut">
               <a:rPr lang="en-US" smtClean="0"/>
-              <a:t>11/7/2017</a:t>
+              <a:t>11/8/2017</a:t>
             </a:fld>
             <a:endParaRPr lang="en-US"/>
           </a:p>
@@ -6245,7 +6329,7 @@
           <a:p>
             <a:fld id="{90455005-09FF-4243-A183-D1053D00688D}" type="datetimeFigureOut">
               <a:rPr lang="en-US" smtClean="0"/>
-              <a:t>11/7/2017</a:t>
+              <a:t>11/8/2017</a:t>
             </a:fld>
             <a:endParaRPr lang="en-US"/>
           </a:p>
@@ -7103,7 +7187,6 @@
               <a:rPr lang="en-US" dirty="0" smtClean="0"/>
               <a:t>Outline</a:t>
             </a:r>
-            <a:endParaRPr lang="en-US" dirty="0" smtClean="0"/>
           </a:p>
           <a:p>
             <a:endParaRPr lang="en-US" dirty="0"/>
@@ -7236,6 +7319,13 @@
   <p:clrMapOvr>
     <a:masterClrMapping/>
   </p:clrMapOvr>
+  <p:timing>
+    <p:tnLst>
+      <p:par>
+        <p:cTn id="1" dur="indefinite" restart="never" nodeType="tmRoot"/>
+      </p:par>
+    </p:tnLst>
+  </p:timing>
 </p:sld>
 </file>
 
@@ -7297,21 +7387,26 @@
             <p:ph type="body" sz="quarter" idx="11"/>
           </p:nvPr>
         </p:nvSpPr>
-        <p:spPr/>
+        <p:spPr>
+          <a:xfrm>
+            <a:off x="473075" y="1890714"/>
+            <a:ext cx="7464425" cy="3121554"/>
+          </a:xfrm>
+        </p:spPr>
         <p:txBody>
           <a:bodyPr/>
           <a:lstStyle/>
           <a:p>
-            <a:r>
-              <a:rPr lang="en-US" dirty="0" smtClean="0"/>
-              <a:t>Add bullets</a:t>
-            </a:r>
-          </a:p>
-          <a:p>
-            <a:r>
-              <a:rPr lang="en-US" dirty="0" smtClean="0"/>
-              <a:t>Another good picture example?  Check Gloria’s paper for something w/ dye?</a:t>
-            </a:r>
+            <a:pPr marL="0" indent="0" algn="ctr">
+              <a:buNone/>
+            </a:pPr>
+            <a:r>
+              <a:rPr lang="en-US" dirty="0" smtClean="0"/>
+              <a:t>   Restore as much information as possible!</a:t>
+            </a:r>
+          </a:p>
+          <a:p>
+            <a:pPr algn="ctr"/>
             <a:endParaRPr lang="en-US" dirty="0"/>
           </a:p>
         </p:txBody>
@@ -7325,7 +7420,7 @@
           <p:nvPr/>
         </p:nvPicPr>
         <p:blipFill>
-          <a:blip r:embed="rId2">
+          <a:blip r:embed="rId3">
             <a:extLst>
               <a:ext uri="{28A0092B-C50C-407E-A947-70E740481C1C}">
                 <a14:useLocalDpi xmlns:a14="http://schemas.microsoft.com/office/drawing/2010/main" val="0"/>
@@ -7338,8 +7433,8 @@
         </p:blipFill>
         <p:spPr>
           <a:xfrm>
-            <a:off x="2242185" y="3672840"/>
-            <a:ext cx="5173980" cy="2026920"/>
+            <a:off x="1140995" y="2693883"/>
+            <a:ext cx="6379945" cy="2499360"/>
           </a:xfrm>
           <a:prstGeom prst="rect">
             <a:avLst/>
@@ -7354,7 +7449,7 @@
         </p:nvSpPr>
         <p:spPr>
           <a:xfrm>
-            <a:off x="2242185" y="5699760"/>
+            <a:off x="1743977" y="5235153"/>
             <a:ext cx="5173980" cy="369332"/>
           </a:xfrm>
           <a:prstGeom prst="rect">
@@ -7389,6 +7484,13 @@
   <p:clrMapOvr>
     <a:masterClrMapping/>
   </p:clrMapOvr>
+  <p:timing>
+    <p:tnLst>
+      <p:par>
+        <p:cTn id="1" dur="indefinite" restart="never" nodeType="tmRoot"/>
+      </p:par>
+    </p:tnLst>
+  </p:timing>
 </p:sld>
 </file>
 
@@ -7457,13 +7559,7 @@
           <a:p>
             <a:r>
               <a:rPr lang="en-US" dirty="0" smtClean="0"/>
-              <a:t>Bullets</a:t>
-            </a:r>
-          </a:p>
-          <a:p>
-            <a:r>
-              <a:rPr lang="en-US" dirty="0" smtClean="0"/>
-              <a:t>Pics?</a:t>
+              <a:t>I honestly have no idea what to actually put on this slide…</a:t>
             </a:r>
             <a:endParaRPr lang="en-US" dirty="0"/>
           </a:p>
@@ -7479,6 +7575,13 @@
   <p:clrMapOvr>
     <a:masterClrMapping/>
   </p:clrMapOvr>
+  <p:timing>
+    <p:tnLst>
+      <p:par>
+        <p:cTn id="1" dur="indefinite" restart="never" nodeType="tmRoot"/>
+      </p:par>
+    </p:tnLst>
+  </p:timing>
 </p:sld>
 </file>
 
@@ -7611,6 +7714,13 @@
   <p:clrMapOvr>
     <a:masterClrMapping/>
   </p:clrMapOvr>
+  <p:timing>
+    <p:tnLst>
+      <p:par>
+        <p:cTn id="1" dur="indefinite" restart="never" nodeType="tmRoot"/>
+      </p:par>
+    </p:tnLst>
+  </p:timing>
 </p:sld>
 </file>
 
@@ -7908,11 +8018,25 @@
             <a:pPr lvl="1"/>
             <a:r>
               <a:rPr lang="en-US" dirty="0" smtClean="0"/>
-              <a:t>Able to replicate results and therefore demonstrate </a:t>
-            </a:r>
-            <a:r>
-              <a:rPr lang="en-US" smtClean="0"/>
-              <a:t>the application</a:t>
+              <a:t>Able to replicate results and therefore demonstrate the </a:t>
+            </a:r>
+            <a:r>
+              <a:rPr lang="en-US" dirty="0" smtClean="0"/>
+              <a:t>application</a:t>
+            </a:r>
+          </a:p>
+          <a:p>
+            <a:pPr lvl="1"/>
+            <a:endParaRPr lang="en-US" dirty="0"/>
+          </a:p>
+          <a:p>
+            <a:r>
+              <a:rPr lang="en-US" dirty="0" smtClean="0"/>
+              <a:t>Emphasize relevance to real world, can use cheaper cameras, tackle challenging observation environment, fix pics that have </a:t>
+            </a:r>
+            <a:r>
+              <a:rPr lang="en-US" smtClean="0"/>
+              <a:t>already been taken a long time ago…</a:t>
             </a:r>
             <a:endParaRPr lang="en-US" dirty="0" smtClean="0"/>
           </a:p>

</xml_diff>

<commit_message>
changes to ppt and script
changes to ppt and script
</commit_message>
<xml_diff>
--- a/Presentation/Diederich_Grassi_Nichols_PPT.pptx
+++ b/Presentation/Diederich_Grassi_Nichols_PPT.pptx
@@ -6,19 +6,20 @@
     <p:sldMasterId id="2147483671" r:id="rId2"/>
   </p:sldMasterIdLst>
   <p:notesMasterIdLst>
-    <p:notesMasterId r:id="rId13"/>
+    <p:notesMasterId r:id="rId14"/>
   </p:notesMasterIdLst>
   <p:sldIdLst>
     <p:sldId id="257" r:id="rId3"/>
     <p:sldId id="262" r:id="rId4"/>
     <p:sldId id="269" r:id="rId5"/>
-    <p:sldId id="270" r:id="rId6"/>
-    <p:sldId id="265" r:id="rId7"/>
-    <p:sldId id="267" r:id="rId8"/>
-    <p:sldId id="266" r:id="rId9"/>
-    <p:sldId id="268" r:id="rId10"/>
-    <p:sldId id="271" r:id="rId11"/>
-    <p:sldId id="264" r:id="rId12"/>
+    <p:sldId id="273" r:id="rId6"/>
+    <p:sldId id="270" r:id="rId7"/>
+    <p:sldId id="265" r:id="rId8"/>
+    <p:sldId id="267" r:id="rId9"/>
+    <p:sldId id="272" r:id="rId10"/>
+    <p:sldId id="266" r:id="rId11"/>
+    <p:sldId id="268" r:id="rId12"/>
+    <p:sldId id="274" r:id="rId13"/>
   </p:sldIdLst>
   <p:sldSz cx="9144000" cy="6858000" type="screen4x3"/>
   <p:notesSz cx="6858000" cy="9144000"/>
@@ -202,7 +203,7 @@
           <a:p>
             <a:fld id="{25210F6A-C8B1-4A89-8624-1778A363FECB}" type="datetimeFigureOut">
               <a:rPr lang="en-US" smtClean="0"/>
-              <a:t>11/8/2017</a:t>
+              <a:t>11/9/2017</a:t>
             </a:fld>
             <a:endParaRPr lang="en-US"/>
           </a:p>
@@ -554,6 +555,90 @@
 </p:notes>
 </file>
 
+<file path=ppt/notesSlides/notesSlide2.xml><?xml version="1.0" encoding="utf-8"?>
+<p:notes xmlns:a="http://schemas.openxmlformats.org/drawingml/2006/main" xmlns:r="http://schemas.openxmlformats.org/officeDocument/2006/relationships" xmlns:p="http://schemas.openxmlformats.org/presentationml/2006/main">
+  <p:cSld>
+    <p:spTree>
+      <p:nvGrpSpPr>
+        <p:cNvPr id="1" name=""/>
+        <p:cNvGrpSpPr/>
+        <p:nvPr/>
+      </p:nvGrpSpPr>
+      <p:grpSpPr>
+        <a:xfrm>
+          <a:off x="0" y="0"/>
+          <a:ext cx="0" cy="0"/>
+          <a:chOff x="0" y="0"/>
+          <a:chExt cx="0" cy="0"/>
+        </a:xfrm>
+      </p:grpSpPr>
+      <p:sp>
+        <p:nvSpPr>
+          <p:cNvPr id="2" name="Slide Image Placeholder 1"/>
+          <p:cNvSpPr>
+            <a:spLocks noGrp="1" noRot="1" noChangeAspect="1"/>
+          </p:cNvSpPr>
+          <p:nvPr>
+            <p:ph type="sldImg"/>
+          </p:nvPr>
+        </p:nvSpPr>
+        <p:spPr/>
+      </p:sp>
+      <p:sp>
+        <p:nvSpPr>
+          <p:cNvPr id="3" name="Notes Placeholder 2"/>
+          <p:cNvSpPr>
+            <a:spLocks noGrp="1"/>
+          </p:cNvSpPr>
+          <p:nvPr>
+            <p:ph type="body" idx="1"/>
+          </p:nvPr>
+        </p:nvSpPr>
+        <p:spPr/>
+        <p:txBody>
+          <a:bodyPr/>
+          <a:lstStyle/>
+          <a:p>
+            <a:endParaRPr lang="en-US" dirty="0"/>
+          </a:p>
+        </p:txBody>
+      </p:sp>
+      <p:sp>
+        <p:nvSpPr>
+          <p:cNvPr id="4" name="Slide Number Placeholder 3"/>
+          <p:cNvSpPr>
+            <a:spLocks noGrp="1"/>
+          </p:cNvSpPr>
+          <p:nvPr>
+            <p:ph type="sldNum" sz="quarter" idx="10"/>
+          </p:nvPr>
+        </p:nvSpPr>
+        <p:spPr/>
+        <p:txBody>
+          <a:bodyPr/>
+          <a:lstStyle/>
+          <a:p>
+            <a:fld id="{E9C93185-2FDD-4F2A-A3C1-F706A3C8E501}" type="slidenum">
+              <a:rPr lang="en-US" smtClean="0"/>
+              <a:t>4</a:t>
+            </a:fld>
+            <a:endParaRPr lang="en-US"/>
+          </a:p>
+        </p:txBody>
+      </p:sp>
+    </p:spTree>
+    <p:extLst>
+      <p:ext uri="{BB962C8B-B14F-4D97-AF65-F5344CB8AC3E}">
+        <p14:creationId xmlns:p14="http://schemas.microsoft.com/office/powerpoint/2010/main" val="1915447384"/>
+      </p:ext>
+    </p:extLst>
+  </p:cSld>
+  <p:clrMapOvr>
+    <a:masterClrMapping/>
+  </p:clrMapOvr>
+</p:notes>
+</file>
+
 <file path=ppt/slideLayouts/slideLayout1.xml><?xml version="1.0" encoding="utf-8"?>
 <p:sldLayout xmlns:a="http://schemas.openxmlformats.org/drawingml/2006/main" xmlns:r="http://schemas.openxmlformats.org/officeDocument/2006/relationships" xmlns:p="http://schemas.openxmlformats.org/presentationml/2006/main" preserve="1">
   <p:cSld name="Title Slide">
@@ -1664,7 +1749,7 @@
           <a:p>
             <a:fld id="{90455005-09FF-4243-A183-D1053D00688D}" type="datetimeFigureOut">
               <a:rPr lang="en-US" smtClean="0"/>
-              <a:t>11/8/2017</a:t>
+              <a:t>11/9/2017</a:t>
             </a:fld>
             <a:endParaRPr lang="en-US"/>
           </a:p>
@@ -1834,7 +1919,7 @@
           <a:p>
             <a:fld id="{90455005-09FF-4243-A183-D1053D00688D}" type="datetimeFigureOut">
               <a:rPr lang="en-US" smtClean="0"/>
-              <a:t>11/8/2017</a:t>
+              <a:t>11/9/2017</a:t>
             </a:fld>
             <a:endParaRPr lang="en-US"/>
           </a:p>
@@ -2080,7 +2165,7 @@
           <a:p>
             <a:fld id="{90455005-09FF-4243-A183-D1053D00688D}" type="datetimeFigureOut">
               <a:rPr lang="en-US" smtClean="0"/>
-              <a:t>11/8/2017</a:t>
+              <a:t>11/9/2017</a:t>
             </a:fld>
             <a:endParaRPr lang="en-US"/>
           </a:p>
@@ -2368,7 +2453,7 @@
           <a:p>
             <a:fld id="{90455005-09FF-4243-A183-D1053D00688D}" type="datetimeFigureOut">
               <a:rPr lang="en-US" smtClean="0"/>
-              <a:t>11/8/2017</a:t>
+              <a:t>11/9/2017</a:t>
             </a:fld>
             <a:endParaRPr lang="en-US"/>
           </a:p>
@@ -2790,7 +2875,7 @@
           <a:p>
             <a:fld id="{90455005-09FF-4243-A183-D1053D00688D}" type="datetimeFigureOut">
               <a:rPr lang="en-US" smtClean="0"/>
-              <a:t>11/8/2017</a:t>
+              <a:t>11/9/2017</a:t>
             </a:fld>
             <a:endParaRPr lang="en-US"/>
           </a:p>
@@ -2908,7 +2993,7 @@
           <a:p>
             <a:fld id="{90455005-09FF-4243-A183-D1053D00688D}" type="datetimeFigureOut">
               <a:rPr lang="en-US" smtClean="0"/>
-              <a:t>11/8/2017</a:t>
+              <a:t>11/9/2017</a:t>
             </a:fld>
             <a:endParaRPr lang="en-US"/>
           </a:p>
@@ -3003,7 +3088,7 @@
           <a:p>
             <a:fld id="{90455005-09FF-4243-A183-D1053D00688D}" type="datetimeFigureOut">
               <a:rPr lang="en-US" smtClean="0"/>
-              <a:t>11/8/2017</a:t>
+              <a:t>11/9/2017</a:t>
             </a:fld>
             <a:endParaRPr lang="en-US"/>
           </a:p>
@@ -3280,7 +3365,7 @@
           <a:p>
             <a:fld id="{90455005-09FF-4243-A183-D1053D00688D}" type="datetimeFigureOut">
               <a:rPr lang="en-US" smtClean="0"/>
-              <a:t>11/8/2017</a:t>
+              <a:t>11/9/2017</a:t>
             </a:fld>
             <a:endParaRPr lang="en-US"/>
           </a:p>
@@ -3646,7 +3731,7 @@
           <a:p>
             <a:fld id="{90455005-09FF-4243-A183-D1053D00688D}" type="datetimeFigureOut">
               <a:rPr lang="en-US" smtClean="0"/>
-              <a:t>11/8/2017</a:t>
+              <a:t>11/9/2017</a:t>
             </a:fld>
             <a:endParaRPr lang="en-US"/>
           </a:p>
@@ -3816,7 +3901,7 @@
           <a:p>
             <a:fld id="{90455005-09FF-4243-A183-D1053D00688D}" type="datetimeFigureOut">
               <a:rPr lang="en-US" smtClean="0"/>
-              <a:t>11/8/2017</a:t>
+              <a:t>11/9/2017</a:t>
             </a:fld>
             <a:endParaRPr lang="en-US"/>
           </a:p>
@@ -3996,7 +4081,7 @@
           <a:p>
             <a:fld id="{90455005-09FF-4243-A183-D1053D00688D}" type="datetimeFigureOut">
               <a:rPr lang="en-US" smtClean="0"/>
-              <a:t>11/8/2017</a:t>
+              <a:t>11/9/2017</a:t>
             </a:fld>
             <a:endParaRPr lang="en-US"/>
           </a:p>
@@ -4515,7 +4600,7 @@
         </p:nvSpPr>
         <p:spPr>
           <a:xfrm>
-            <a:off x="473276" y="712807"/>
+            <a:off x="200562" y="712807"/>
             <a:ext cx="6500612" cy="664714"/>
           </a:xfrm>
           <a:prstGeom prst="rect">
@@ -4569,7 +4654,7 @@
           <a:lstStyle>
             <a:lvl1pPr>
               <a:lnSpc>
-                <a:spcPts val="3600"/>
+                <a:spcPct val="100000"/>
               </a:lnSpc>
               <a:spcBef>
                 <a:spcPts val="0"/>
@@ -4587,6 +4672,9 @@
               </a:defRPr>
             </a:lvl1pPr>
             <a:lvl2pPr>
+              <a:lnSpc>
+                <a:spcPct val="100000"/>
+              </a:lnSpc>
               <a:spcAft>
                 <a:spcPts val="600"/>
               </a:spcAft>
@@ -4597,6 +4685,9 @@
               </a:defRPr>
             </a:lvl2pPr>
             <a:lvl3pPr>
+              <a:lnSpc>
+                <a:spcPct val="100000"/>
+              </a:lnSpc>
               <a:spcBef>
                 <a:spcPts val="1200"/>
               </a:spcBef>
@@ -5680,7 +5771,7 @@
         </p:nvSpPr>
         <p:spPr>
           <a:xfrm>
-            <a:off x="473276" y="712807"/>
+            <a:off x="160457" y="712807"/>
             <a:ext cx="6500612" cy="664714"/>
           </a:xfrm>
           <a:prstGeom prst="rect">
@@ -5734,7 +5825,7 @@
           <a:lstStyle>
             <a:lvl1pPr>
               <a:lnSpc>
-                <a:spcPts val="3600"/>
+                <a:spcPct val="100000"/>
               </a:lnSpc>
               <a:spcBef>
                 <a:spcPts val="0"/>
@@ -6329,7 +6420,7 @@
           <a:p>
             <a:fld id="{90455005-09FF-4243-A183-D1053D00688D}" type="datetimeFigureOut">
               <a:rPr lang="en-US" smtClean="0"/>
-              <a:t>11/8/2017</a:t>
+              <a:t>11/9/2017</a:t>
             </a:fld>
             <a:endParaRPr lang="en-US"/>
           </a:p>
@@ -6728,9 +6819,18 @@
               <a:t>Deblurring</a:t>
             </a:r>
             <a:r>
-              <a:rPr lang="en-US" dirty="0" smtClean="0"/>
-              <a:t>: </a:t>
-            </a:r>
+              <a:rPr lang="en-US" dirty="0"/>
+              <a:t> </a:t>
+            </a:r>
+            <a:r>
+              <a:rPr lang="en-US" dirty="0" smtClean="0"/>
+              <a:t>through</a:t>
+            </a:r>
+            <a:r>
+              <a:rPr lang="en-US" dirty="0" smtClean="0"/>
+              <a:t> </a:t>
+            </a:r>
+            <a:endParaRPr lang="en-US" dirty="0" smtClean="0"/>
           </a:p>
           <a:p>
             <a:r>
@@ -7047,7 +7147,7 @@
           <a:p>
             <a:r>
               <a:rPr lang="en-US" dirty="0" smtClean="0"/>
-              <a:t>Introduction</a:t>
+              <a:t>Summary/Conclusions</a:t>
             </a:r>
             <a:endParaRPr lang="en-US" dirty="0"/>
           </a:p>
@@ -7063,85 +7163,224 @@
             <p:ph type="body" sz="quarter" idx="11"/>
           </p:nvPr>
         </p:nvSpPr>
-        <p:spPr>
-          <a:xfrm>
-            <a:off x="473075" y="1852613"/>
-            <a:ext cx="7464425" cy="5005387"/>
-          </a:xfrm>
-        </p:spPr>
+        <p:spPr/>
         <p:txBody>
           <a:bodyPr/>
           <a:lstStyle/>
           <a:p>
             <a:r>
               <a:rPr lang="en-US" dirty="0" smtClean="0"/>
-              <a:t>What is Image </a:t>
+              <a:t>Summary</a:t>
+            </a:r>
+            <a:endParaRPr lang="en-US" dirty="0"/>
+          </a:p>
+          <a:p>
+            <a:pPr lvl="1"/>
+            <a:r>
+              <a:rPr lang="en-US" dirty="0" smtClean="0"/>
+              <a:t>Image </a:t>
             </a:r>
             <a:r>
               <a:rPr lang="en-US" dirty="0" err="1" smtClean="0"/>
-              <a:t>Deblurring</a:t>
-            </a:r>
-            <a:r>
-              <a:rPr lang="en-US" dirty="0" smtClean="0"/>
-              <a:t>?</a:t>
+              <a:t>deblurring</a:t>
+            </a:r>
+            <a:r>
+              <a:rPr lang="en-US" dirty="0" smtClean="0"/>
+              <a:t> and significance</a:t>
             </a:r>
           </a:p>
           <a:p>
             <a:pPr lvl="1"/>
             <a:r>
               <a:rPr lang="en-US" dirty="0" smtClean="0"/>
-              <a:t>Restoring an image without reference of the original source</a:t>
-            </a:r>
-          </a:p>
-          <a:p>
-            <a:r>
-              <a:rPr lang="en-US" dirty="0" smtClean="0"/>
-              <a:t>Significance</a:t>
+              <a:t>How Matrix Theory is instrumental to this application</a:t>
+            </a:r>
+          </a:p>
+          <a:p>
+            <a:r>
+              <a:rPr lang="en-US" dirty="0" smtClean="0"/>
+              <a:t>Conclusions</a:t>
             </a:r>
           </a:p>
           <a:p>
             <a:pPr lvl="1"/>
             <a:r>
               <a:rPr lang="en-US" dirty="0" smtClean="0"/>
-              <a:t>Clarity in images can define the results in certain fields of research</a:t>
+              <a:t>Able to replicate results and therefore demonstrate the </a:t>
+            </a:r>
+            <a:r>
+              <a:rPr lang="en-US" dirty="0" smtClean="0"/>
+              <a:t>application</a:t>
             </a:r>
             <a:endParaRPr lang="en-US" dirty="0"/>
           </a:p>
           <a:p>
             <a:r>
               <a:rPr lang="en-US" dirty="0" smtClean="0"/>
-              <a:t>Motivation/Goal</a:t>
-            </a:r>
-          </a:p>
-          <a:p>
-            <a:pPr lvl="1"/>
-            <a:r>
-              <a:rPr lang="en-US" dirty="0" smtClean="0"/>
-              <a:t>Investigate models that </a:t>
-            </a:r>
-            <a:r>
-              <a:rPr lang="en-US" dirty="0" err="1" smtClean="0"/>
-              <a:t>Matlab’s</a:t>
-            </a:r>
-            <a:r>
-              <a:rPr lang="en-US" dirty="0" smtClean="0"/>
-              <a:t> built-in method is based on</a:t>
-            </a:r>
-          </a:p>
-          <a:p>
-            <a:pPr lvl="1"/>
-            <a:r>
-              <a:rPr lang="en-US" dirty="0" smtClean="0"/>
-              <a:t>Replicate selected results to show magnitude of algorithms and methods</a:t>
-            </a:r>
-            <a:endParaRPr lang="en-US" dirty="0"/>
+              <a:t>Emphasize relevance to real world, can use cheaper cameras, tackle challenging observation environment, </a:t>
+            </a:r>
+            <a:r>
+              <a:rPr lang="en-US" dirty="0" smtClean="0"/>
+              <a:t>restore</a:t>
+            </a:r>
+            <a:r>
+              <a:rPr lang="en-US" dirty="0" smtClean="0"/>
+              <a:t> images that have degraded or were poor quality to begin with</a:t>
+            </a:r>
+            <a:endParaRPr lang="en-US" dirty="0" smtClean="0"/>
           </a:p>
         </p:txBody>
       </p:sp>
     </p:spTree>
     <p:extLst>
       <p:ext uri="{BB962C8B-B14F-4D97-AF65-F5344CB8AC3E}">
-        <p14:creationId xmlns:p14="http://schemas.microsoft.com/office/powerpoint/2010/main" val="772297214"/>
+        <p14:creationId xmlns:p14="http://schemas.microsoft.com/office/powerpoint/2010/main" val="3396068983"/>
+      </p:ext>
+    </p:extLst>
+  </p:cSld>
+  <p:clrMapOvr>
+    <a:masterClrMapping/>
+  </p:clrMapOvr>
+</p:sld>
+</file>
+
+<file path=ppt/slides/slide11.xml><?xml version="1.0" encoding="utf-8"?>
+<p:sld xmlns:a="http://schemas.openxmlformats.org/drawingml/2006/main" xmlns:r="http://schemas.openxmlformats.org/officeDocument/2006/relationships" xmlns:p="http://schemas.openxmlformats.org/presentationml/2006/main">
+  <p:cSld>
+    <p:spTree>
+      <p:nvGrpSpPr>
+        <p:cNvPr id="1" name=""/>
+        <p:cNvGrpSpPr/>
+        <p:nvPr/>
+      </p:nvGrpSpPr>
+      <p:grpSpPr>
+        <a:xfrm>
+          <a:off x="0" y="0"/>
+          <a:ext cx="0" cy="0"/>
+          <a:chOff x="0" y="0"/>
+          <a:chExt cx="0" cy="0"/>
+        </a:xfrm>
+      </p:grpSpPr>
+      <p:sp>
+        <p:nvSpPr>
+          <p:cNvPr id="2" name="Text Placeholder 1"/>
+          <p:cNvSpPr>
+            <a:spLocks noGrp="1"/>
+          </p:cNvSpPr>
+          <p:nvPr>
+            <p:ph type="body" sz="quarter" idx="10"/>
+          </p:nvPr>
+        </p:nvSpPr>
+        <p:spPr/>
+        <p:txBody>
+          <a:bodyPr/>
+          <a:lstStyle/>
+          <a:p>
+            <a:r>
+              <a:rPr lang="en-US" dirty="0" smtClean="0"/>
+              <a:t>References</a:t>
+            </a:r>
+            <a:endParaRPr lang="en-US" dirty="0"/>
+          </a:p>
+        </p:txBody>
+      </p:sp>
+      <p:sp>
+        <p:nvSpPr>
+          <p:cNvPr id="3" name="Text Placeholder 2"/>
+          <p:cNvSpPr>
+            <a:spLocks noGrp="1"/>
+          </p:cNvSpPr>
+          <p:nvPr>
+            <p:ph type="body" sz="quarter" idx="11"/>
+          </p:nvPr>
+        </p:nvSpPr>
+        <p:spPr/>
+        <p:txBody>
+          <a:bodyPr/>
+          <a:lstStyle/>
+          <a:p>
+            <a:pPr>
+              <a:lnSpc>
+                <a:spcPct val="100000"/>
+              </a:lnSpc>
+            </a:pPr>
+            <a:r>
+              <a:rPr lang="en-US" sz="1100" dirty="0"/>
+              <a:t>Ayers, G. R., and J. C. Dainty. ``Iterative blind </a:t>
+            </a:r>
+            <a:r>
+              <a:rPr lang="en-US" sz="1100" dirty="0" err="1"/>
+              <a:t>deconvolution</a:t>
+            </a:r>
+            <a:r>
+              <a:rPr lang="en-US" sz="1100" dirty="0"/>
+              <a:t> method and its applications.'' Optics Letters, vol. 13, no. 7, Jan. 1988, p. 547., doi:10.1364/ol.13.000547</a:t>
+            </a:r>
+          </a:p>
+          <a:p>
+            <a:pPr>
+              <a:lnSpc>
+                <a:spcPct val="100000"/>
+              </a:lnSpc>
+            </a:pPr>
+            <a:r>
+              <a:rPr lang="en-US" sz="1100" dirty="0" smtClean="0"/>
+              <a:t>Holmes </a:t>
+            </a:r>
+            <a:r>
+              <a:rPr lang="en-US" sz="1100" dirty="0"/>
+              <a:t>T.J., Biggs D., Abu-</a:t>
+            </a:r>
+            <a:r>
+              <a:rPr lang="en-US" sz="1100" dirty="0" err="1"/>
+              <a:t>Tarif</a:t>
+            </a:r>
+            <a:r>
+              <a:rPr lang="en-US" sz="1100" dirty="0"/>
+              <a:t> A. (2006) Blind </a:t>
+            </a:r>
+            <a:r>
+              <a:rPr lang="en-US" sz="1100" dirty="0" err="1"/>
+              <a:t>Deconvolution</a:t>
+            </a:r>
+            <a:r>
+              <a:rPr lang="en-US" sz="1100" dirty="0"/>
+              <a:t>. In: Pawley J. (</a:t>
+            </a:r>
+            <a:r>
+              <a:rPr lang="en-US" sz="1100" dirty="0" err="1"/>
+              <a:t>eds</a:t>
+            </a:r>
+            <a:r>
+              <a:rPr lang="en-US" sz="1100" dirty="0"/>
+              <a:t>) Handbook Of Biological Confocal Microscopy. Springer, Boston, </a:t>
+            </a:r>
+            <a:r>
+              <a:rPr lang="en-US" sz="1100" dirty="0" smtClean="0"/>
+              <a:t>MA</a:t>
+            </a:r>
+          </a:p>
+          <a:p>
+            <a:pPr>
+              <a:lnSpc>
+                <a:spcPct val="100000"/>
+              </a:lnSpc>
+            </a:pPr>
+            <a:r>
+              <a:rPr lang="en-US" sz="1100" dirty="0"/>
+              <a:t>Biggs, David S. C., and Mark Andrews. ``Acceleration of iterative image restoration algorithms.'' Applied Optics, vol. 36, no. 8, Oct. 1997, pp. 1766–1775., doi:10.1364/ao.36.001766.</a:t>
+            </a:r>
+            <a:endParaRPr lang="en-US" sz="1100" dirty="0" smtClean="0"/>
+          </a:p>
+          <a:p>
+            <a:endParaRPr lang="en-US" dirty="0"/>
+          </a:p>
+        </p:txBody>
+      </p:sp>
+    </p:spTree>
+    <p:extLst>
+      <p:ext uri="{BB962C8B-B14F-4D97-AF65-F5344CB8AC3E}">
+        <p14:creationId xmlns:p14="http://schemas.microsoft.com/office/powerpoint/2010/main" val="3446083362"/>
       </p:ext>
     </p:extLst>
   </p:cSld>
@@ -7205,14 +7444,19 @@
         </p:nvSpPr>
         <p:spPr>
           <a:xfrm>
-            <a:off x="473075" y="1700214"/>
-            <a:ext cx="7464425" cy="4148941"/>
+            <a:off x="473075" y="1852614"/>
+            <a:ext cx="7464425" cy="4146534"/>
           </a:xfrm>
         </p:spPr>
         <p:txBody>
           <a:bodyPr/>
           <a:lstStyle/>
           <a:p>
+            <a:pPr>
+              <a:lnSpc>
+                <a:spcPct val="100000"/>
+              </a:lnSpc>
+            </a:pPr>
             <a:r>
               <a:rPr lang="en-US" sz="1800" dirty="0" smtClean="0"/>
               <a:t>Introduction</a:t>
@@ -7222,6 +7466,13 @@
             <a:pPr lvl="1"/>
             <a:r>
               <a:rPr lang="en-US" sz="1400" dirty="0" smtClean="0"/>
+              <a:t>Motivation</a:t>
+            </a:r>
+          </a:p>
+          <a:p>
+            <a:pPr lvl="1"/>
+            <a:r>
+              <a:rPr lang="en-US" sz="1400" dirty="0" smtClean="0"/>
               <a:t>Image </a:t>
             </a:r>
             <a:r>
@@ -7234,13 +7485,6 @@
             <a:pPr lvl="1"/>
             <a:r>
               <a:rPr lang="en-US" sz="1400" dirty="0" smtClean="0"/>
-              <a:t>Significance</a:t>
-            </a:r>
-          </a:p>
-          <a:p>
-            <a:pPr lvl="1"/>
-            <a:r>
-              <a:rPr lang="en-US" sz="1400" dirty="0" smtClean="0"/>
               <a:t>Blind </a:t>
             </a:r>
             <a:r>
@@ -7250,6 +7494,11 @@
             <a:endParaRPr lang="en-US" sz="1400" dirty="0"/>
           </a:p>
           <a:p>
+            <a:pPr>
+              <a:lnSpc>
+                <a:spcPct val="100000"/>
+              </a:lnSpc>
+            </a:pPr>
             <a:r>
               <a:rPr lang="en-US" sz="1800" dirty="0"/>
               <a:t>Model</a:t>
@@ -7258,20 +7507,10 @@
           <a:p>
             <a:pPr lvl="1"/>
             <a:r>
-              <a:rPr lang="en-US" sz="1400" dirty="0"/>
+              <a:rPr lang="en-US" sz="1400" dirty="0" smtClean="0"/>
               <a:t>Terminology</a:t>
             </a:r>
-          </a:p>
-          <a:p>
-            <a:pPr lvl="1"/>
-            <a:r>
-              <a:rPr lang="en-US" sz="1400" dirty="0" smtClean="0"/>
-              <a:t>Variable </a:t>
-            </a:r>
-            <a:r>
-              <a:rPr lang="en-US" sz="1400" dirty="0"/>
-              <a:t>and Function Definitions</a:t>
-            </a:r>
+            <a:endParaRPr lang="en-US" sz="1400" dirty="0"/>
           </a:p>
           <a:p>
             <a:pPr lvl="1"/>
@@ -7281,6 +7520,11 @@
             </a:r>
           </a:p>
           <a:p>
+            <a:pPr>
+              <a:lnSpc>
+                <a:spcPct val="100000"/>
+              </a:lnSpc>
+            </a:pPr>
             <a:r>
               <a:rPr lang="en-US" sz="1800" dirty="0"/>
               <a:t>Results</a:t>
@@ -7298,6 +7542,11 @@
             </a:r>
           </a:p>
           <a:p>
+            <a:pPr>
+              <a:lnSpc>
+                <a:spcPct val="100000"/>
+              </a:lnSpc>
+            </a:pPr>
             <a:r>
               <a:rPr lang="en-US" sz="1800" dirty="0" smtClean="0"/>
               <a:t>Conclusions</a:t>
@@ -7305,6 +7554,11 @@
             <a:endParaRPr lang="en-US" sz="1800" dirty="0"/>
           </a:p>
           <a:p>
+            <a:pPr>
+              <a:lnSpc>
+                <a:spcPct val="100000"/>
+              </a:lnSpc>
+            </a:pPr>
             <a:endParaRPr lang="en-US" sz="1800" dirty="0"/>
           </a:p>
         </p:txBody>
@@ -7363,15 +7617,7 @@
           <a:p>
             <a:r>
               <a:rPr lang="en-US" dirty="0" smtClean="0"/>
-              <a:t>What is image </a:t>
-            </a:r>
-            <a:r>
-              <a:rPr lang="en-US" dirty="0" err="1" smtClean="0"/>
-              <a:t>deblurring</a:t>
-            </a:r>
-            <a:r>
-              <a:rPr lang="en-US" dirty="0" smtClean="0"/>
-              <a:t>?</a:t>
+              <a:t>Introduction</a:t>
             </a:r>
             <a:endParaRPr lang="en-US" dirty="0"/>
           </a:p>
@@ -7379,7 +7625,7 @@
       </p:sp>
       <p:sp>
         <p:nvSpPr>
-          <p:cNvPr id="3" name="Text Placeholder 2"/>
+          <p:cNvPr id="6" name="Text Placeholder 5"/>
           <p:cNvSpPr>
             <a:spLocks noGrp="1"/>
           </p:cNvSpPr>
@@ -7387,90 +7633,45 @@
             <p:ph type="body" sz="quarter" idx="11"/>
           </p:nvPr>
         </p:nvSpPr>
-        <p:spPr>
-          <a:xfrm>
-            <a:off x="473075" y="1890714"/>
-            <a:ext cx="7464425" cy="3121554"/>
-          </a:xfrm>
-        </p:spPr>
+        <p:spPr/>
         <p:txBody>
           <a:bodyPr/>
           <a:lstStyle/>
           <a:p>
-            <a:pPr marL="0" indent="0" algn="ctr">
-              <a:buNone/>
-            </a:pPr>
-            <a:r>
-              <a:rPr lang="en-US" dirty="0" smtClean="0"/>
-              <a:t>   Restore as much information as possible!</a:t>
-            </a:r>
-          </a:p>
-          <a:p>
-            <a:pPr algn="ctr"/>
+            <a:r>
+              <a:rPr lang="en-US" dirty="0" smtClean="0"/>
+              <a:t>Motivation</a:t>
+            </a:r>
+          </a:p>
+          <a:p>
+            <a:pPr lvl="1"/>
+            <a:r>
+              <a:rPr lang="en-US" dirty="0" smtClean="0"/>
+              <a:t>Discuss relevance and significance</a:t>
+            </a:r>
+          </a:p>
+          <a:p>
+            <a:pPr lvl="1"/>
+            <a:r>
+              <a:rPr lang="en-US" dirty="0" smtClean="0"/>
+              <a:t>Explain theory and concept</a:t>
+            </a:r>
+          </a:p>
+          <a:p>
+            <a:pPr lvl="1"/>
+            <a:r>
+              <a:rPr lang="en-US" dirty="0" smtClean="0"/>
+              <a:t>Demonstrate methods in </a:t>
+            </a:r>
+            <a:r>
+              <a:rPr lang="en-US" dirty="0" err="1" smtClean="0"/>
+              <a:t>Matlab</a:t>
+            </a:r>
+            <a:r>
+              <a:rPr lang="en-US" dirty="0" smtClean="0"/>
+              <a:t> </a:t>
+            </a:r>
             <a:endParaRPr lang="en-US" dirty="0"/>
-          </a:p>
-        </p:txBody>
-      </p:sp>
-      <p:pic>
-        <p:nvPicPr>
-          <p:cNvPr id="4" name="Picture 3"/>
-          <p:cNvPicPr>
-            <a:picLocks noChangeAspect="1"/>
-          </p:cNvPicPr>
-          <p:nvPr/>
-        </p:nvPicPr>
-        <p:blipFill>
-          <a:blip r:embed="rId3">
-            <a:extLst>
-              <a:ext uri="{28A0092B-C50C-407E-A947-70E740481C1C}">
-                <a14:useLocalDpi xmlns:a14="http://schemas.microsoft.com/office/drawing/2010/main" val="0"/>
-              </a:ext>
-            </a:extLst>
-          </a:blip>
-          <a:stretch>
-            <a:fillRect/>
-          </a:stretch>
-        </p:blipFill>
-        <p:spPr>
-          <a:xfrm>
-            <a:off x="1140995" y="2693883"/>
-            <a:ext cx="6379945" cy="2499360"/>
-          </a:xfrm>
-          <a:prstGeom prst="rect">
-            <a:avLst/>
-          </a:prstGeom>
-        </p:spPr>
-      </p:pic>
-      <p:sp>
-        <p:nvSpPr>
-          <p:cNvPr id="5" name="TextBox 4"/>
-          <p:cNvSpPr txBox="1"/>
-          <p:nvPr/>
-        </p:nvSpPr>
-        <p:spPr>
-          <a:xfrm>
-            <a:off x="1743977" y="5235153"/>
-            <a:ext cx="5173980" cy="369332"/>
-          </a:xfrm>
-          <a:prstGeom prst="rect">
-            <a:avLst/>
-          </a:prstGeom>
-          <a:noFill/>
-        </p:spPr>
-        <p:txBody>
-          <a:bodyPr wrap="square" rtlCol="0">
-            <a:spAutoFit/>
-          </a:bodyPr>
-          <a:lstStyle/>
-          <a:p>
-            <a:r>
-              <a:rPr lang="en-US" sz="900" dirty="0" smtClean="0"/>
-              <a:t>Obtained from: https</a:t>
-            </a:r>
-            <a:r>
-              <a:rPr lang="en-US" sz="900" dirty="0"/>
-              <a:t>://www.semanticscholar.org/paper/CNN-for-license-plate-motion-deblurring-Svoboda-Hradis/1a16cae98556f70b10571a8906fe967ee1b1496b</a:t>
-            </a:r>
           </a:p>
         </p:txBody>
       </p:sp>
@@ -7528,23 +7729,86 @@
           <a:p>
             <a:r>
               <a:rPr lang="en-US" dirty="0" smtClean="0"/>
-              <a:t>What is blind </a:t>
+              <a:t>Introduction: Image </a:t>
             </a:r>
             <a:r>
               <a:rPr lang="en-US" dirty="0" err="1" smtClean="0"/>
-              <a:t>deconvolution</a:t>
-            </a:r>
-            <a:r>
-              <a:rPr lang="en-US" dirty="0" smtClean="0"/>
-              <a:t>?</a:t>
+              <a:t>D</a:t>
+            </a:r>
+            <a:r>
+              <a:rPr lang="en-US" dirty="0" err="1" smtClean="0"/>
+              <a:t>eblurring</a:t>
             </a:r>
             <a:endParaRPr lang="en-US" dirty="0"/>
           </a:p>
         </p:txBody>
       </p:sp>
-      <p:sp>
-        <p:nvSpPr>
-          <p:cNvPr id="3" name="Text Placeholder 2"/>
+      <p:pic>
+        <p:nvPicPr>
+          <p:cNvPr id="4" name="Picture 3"/>
+          <p:cNvPicPr>
+            <a:picLocks noChangeAspect="1"/>
+          </p:cNvPicPr>
+          <p:nvPr/>
+        </p:nvPicPr>
+        <p:blipFill>
+          <a:blip r:embed="rId3">
+            <a:extLst>
+              <a:ext uri="{28A0092B-C50C-407E-A947-70E740481C1C}">
+                <a14:useLocalDpi xmlns:a14="http://schemas.microsoft.com/office/drawing/2010/main" val="0"/>
+              </a:ext>
+            </a:extLst>
+          </a:blip>
+          <a:stretch>
+            <a:fillRect/>
+          </a:stretch>
+        </p:blipFill>
+        <p:spPr>
+          <a:xfrm>
+            <a:off x="1140995" y="3724488"/>
+            <a:ext cx="6379945" cy="2499360"/>
+          </a:xfrm>
+          <a:prstGeom prst="rect">
+            <a:avLst/>
+          </a:prstGeom>
+        </p:spPr>
+      </p:pic>
+      <p:sp>
+        <p:nvSpPr>
+          <p:cNvPr id="5" name="TextBox 4"/>
+          <p:cNvSpPr txBox="1"/>
+          <p:nvPr/>
+        </p:nvSpPr>
+        <p:spPr>
+          <a:xfrm>
+            <a:off x="3008755" y="6240216"/>
+            <a:ext cx="5173980" cy="369332"/>
+          </a:xfrm>
+          <a:prstGeom prst="rect">
+            <a:avLst/>
+          </a:prstGeom>
+          <a:noFill/>
+        </p:spPr>
+        <p:txBody>
+          <a:bodyPr wrap="square" rtlCol="0">
+            <a:spAutoFit/>
+          </a:bodyPr>
+          <a:lstStyle/>
+          <a:p>
+            <a:r>
+              <a:rPr lang="en-US" sz="900" dirty="0" smtClean="0"/>
+              <a:t>Obtained from: https</a:t>
+            </a:r>
+            <a:r>
+              <a:rPr lang="en-US" sz="900" dirty="0"/>
+              <a:t>://www.semanticscholar.org/paper/CNN-for-license-plate-motion-deblurring-Svoboda-Hradis/1a16cae98556f70b10571a8906fe967ee1b1496b</a:t>
+            </a:r>
+          </a:p>
+        </p:txBody>
+      </p:sp>
+      <p:sp>
+        <p:nvSpPr>
+          <p:cNvPr id="6" name="Text Placeholder 5"/>
           <p:cNvSpPr>
             <a:spLocks noGrp="1"/>
           </p:cNvSpPr>
@@ -7559,7 +7823,58 @@
           <a:p>
             <a:r>
               <a:rPr lang="en-US" dirty="0" smtClean="0"/>
-              <a:t>I honestly have no idea what to actually put on this slide…</a:t>
+              <a:t>Significance</a:t>
+            </a:r>
+          </a:p>
+          <a:p>
+            <a:r>
+              <a:rPr lang="en-US" dirty="0" smtClean="0"/>
+              <a:t>Relevance to Matrix Theory</a:t>
+            </a:r>
+          </a:p>
+          <a:p>
+            <a:r>
+              <a:rPr lang="en-US" dirty="0" smtClean="0"/>
+              <a:t>Goal: Restore </a:t>
+            </a:r>
+            <a:r>
+              <a:rPr lang="en-US" dirty="0"/>
+              <a:t>as much information as possible</a:t>
+            </a:r>
+          </a:p>
+          <a:p>
+            <a:endParaRPr lang="en-US" dirty="0" smtClean="0"/>
+          </a:p>
+          <a:p>
+            <a:endParaRPr lang="en-US" dirty="0"/>
+          </a:p>
+        </p:txBody>
+      </p:sp>
+      <p:sp>
+        <p:nvSpPr>
+          <p:cNvPr id="7" name="TextBox 6"/>
+          <p:cNvSpPr txBox="1"/>
+          <p:nvPr/>
+        </p:nvSpPr>
+        <p:spPr>
+          <a:xfrm>
+            <a:off x="5845323" y="2033899"/>
+            <a:ext cx="2247544" cy="369332"/>
+          </a:xfrm>
+          <a:prstGeom prst="rect">
+            <a:avLst/>
+          </a:prstGeom>
+          <a:noFill/>
+        </p:spPr>
+        <p:txBody>
+          <a:bodyPr wrap="square" rtlCol="0">
+            <a:spAutoFit/>
+          </a:bodyPr>
+          <a:lstStyle/>
+          <a:p>
+            <a:r>
+              <a:rPr lang="en-US" dirty="0" smtClean="0"/>
+              <a:t>Reference(s)?</a:t>
             </a:r>
             <a:endParaRPr lang="en-US" dirty="0"/>
           </a:p>
@@ -7568,7 +7883,7 @@
     </p:spTree>
     <p:extLst>
       <p:ext uri="{BB962C8B-B14F-4D97-AF65-F5344CB8AC3E}">
-        <p14:creationId xmlns:p14="http://schemas.microsoft.com/office/powerpoint/2010/main" val="4156125385"/>
+        <p14:creationId xmlns:p14="http://schemas.microsoft.com/office/powerpoint/2010/main" val="1566517507"/>
       </p:ext>
     </p:extLst>
   </p:cSld>
@@ -7612,14 +7927,23 @@
             <p:ph type="body" sz="quarter" idx="10"/>
           </p:nvPr>
         </p:nvSpPr>
-        <p:spPr/>
+        <p:spPr>
+          <a:xfrm>
+            <a:off x="200561" y="712807"/>
+            <a:ext cx="8148679" cy="664714"/>
+          </a:xfrm>
+        </p:spPr>
         <p:txBody>
           <a:bodyPr/>
           <a:lstStyle/>
           <a:p>
             <a:r>
               <a:rPr lang="en-US" dirty="0" smtClean="0"/>
-              <a:t>Model</a:t>
+              <a:t>Introduction: Blind </a:t>
+            </a:r>
+            <a:r>
+              <a:rPr lang="en-US" dirty="0" err="1" smtClean="0"/>
+              <a:t>Deconvolution</a:t>
             </a:r>
             <a:endParaRPr lang="en-US" dirty="0"/>
           </a:p>
@@ -7634,80 +7958,80 @@
           <p:nvPr>
             <p:ph type="body" sz="quarter" idx="11"/>
           </p:nvPr>
+        </p:nvSpPr>
+        <p:spPr/>
+        <p:txBody>
+          <a:bodyPr/>
+          <a:lstStyle/>
+          <a:p>
+            <a:r>
+              <a:rPr lang="en-US" dirty="0" smtClean="0"/>
+              <a:t>Deriving </a:t>
+            </a:r>
+            <a:r>
+              <a:rPr lang="en-US" dirty="0"/>
+              <a:t>the original sources of signal through the convolution of the two sources </a:t>
+            </a:r>
+          </a:p>
+          <a:p>
+            <a:r>
+              <a:rPr lang="en-US" dirty="0"/>
+              <a:t>In the context of Image </a:t>
+            </a:r>
+            <a:r>
+              <a:rPr lang="en-US" dirty="0" err="1"/>
+              <a:t>Deblurring</a:t>
+            </a:r>
+            <a:r>
+              <a:rPr lang="en-US" dirty="0"/>
+              <a:t>: Achieving signal from the convolution of signal, background and Poisson noise</a:t>
+            </a:r>
+          </a:p>
+          <a:p>
+            <a:r>
+              <a:rPr lang="en-US" dirty="0"/>
+              <a:t>Process is done by using iterative processes to find the maximum likelihood of sources</a:t>
+            </a:r>
+          </a:p>
+          <a:p>
+            <a:endParaRPr lang="en-US" dirty="0"/>
+          </a:p>
+        </p:txBody>
+      </p:sp>
+      <p:sp>
+        <p:nvSpPr>
+          <p:cNvPr id="5" name="TextBox 4"/>
+          <p:cNvSpPr txBox="1"/>
+          <p:nvPr/>
         </p:nvSpPr>
         <p:spPr>
           <a:xfrm>
-            <a:off x="473075" y="1852614"/>
-            <a:ext cx="7464425" cy="4928432"/>
+            <a:off x="6101696" y="1517465"/>
+            <a:ext cx="2247544" cy="369332"/>
           </a:xfrm>
+          <a:prstGeom prst="rect">
+            <a:avLst/>
+          </a:prstGeom>
+          <a:noFill/>
         </p:spPr>
         <p:txBody>
-          <a:bodyPr/>
+          <a:bodyPr wrap="square" rtlCol="0">
+            <a:spAutoFit/>
+          </a:bodyPr>
           <a:lstStyle/>
           <a:p>
             <a:r>
               <a:rPr lang="en-US" dirty="0" smtClean="0"/>
-              <a:t>Terminology</a:t>
-            </a:r>
-          </a:p>
-          <a:p>
-            <a:pPr lvl="1"/>
-            <a:r>
-              <a:rPr lang="en-US" dirty="0" smtClean="0"/>
-              <a:t>Noise, Background, Signal</a:t>
-            </a:r>
-          </a:p>
-          <a:p>
-            <a:r>
-              <a:rPr lang="en-US" dirty="0"/>
-              <a:t>Blind </a:t>
-            </a:r>
-            <a:r>
-              <a:rPr lang="en-US" dirty="0" err="1"/>
-              <a:t>Deconvolution</a:t>
+              <a:t>Reference(s)?</a:t>
             </a:r>
             <a:endParaRPr lang="en-US" dirty="0"/>
-          </a:p>
-          <a:p>
-            <a:pPr lvl="1"/>
-            <a:r>
-              <a:rPr lang="en-US" dirty="0"/>
-              <a:t>Deriving the original sources of signal through the convolution of the two sources </a:t>
-            </a:r>
-          </a:p>
-          <a:p>
-            <a:pPr lvl="1"/>
-            <a:r>
-              <a:rPr lang="en-US" dirty="0" smtClean="0"/>
-              <a:t>In the context of Image </a:t>
-            </a:r>
-            <a:r>
-              <a:rPr lang="en-US" dirty="0" err="1" smtClean="0"/>
-              <a:t>Deblurring</a:t>
-            </a:r>
-            <a:r>
-              <a:rPr lang="en-US" dirty="0" smtClean="0"/>
-              <a:t>: Achieving signal from the convolution of signal, background and </a:t>
-            </a:r>
-            <a:r>
-              <a:rPr lang="en-US" smtClean="0"/>
-              <a:t>Poisson noise</a:t>
-            </a:r>
-            <a:endParaRPr lang="en-US" dirty="0" smtClean="0"/>
-          </a:p>
-          <a:p>
-            <a:pPr lvl="1"/>
-            <a:r>
-              <a:rPr lang="en-US" dirty="0" smtClean="0"/>
-              <a:t>Process is done by using iterative processes to find the maximum likelihood of sources</a:t>
-            </a:r>
           </a:p>
         </p:txBody>
       </p:sp>
     </p:spTree>
     <p:extLst>
       <p:ext uri="{BB962C8B-B14F-4D97-AF65-F5344CB8AC3E}">
-        <p14:creationId xmlns:p14="http://schemas.microsoft.com/office/powerpoint/2010/main" val="1222160906"/>
+        <p14:creationId xmlns:p14="http://schemas.microsoft.com/office/powerpoint/2010/main" val="4156125385"/>
       </p:ext>
     </p:extLst>
   </p:cSld>
@@ -7758,7 +8082,7 @@
           <a:p>
             <a:r>
               <a:rPr lang="en-US" dirty="0" smtClean="0"/>
-              <a:t>Model (cont.)</a:t>
+              <a:t>Model: Terminology </a:t>
             </a:r>
             <a:endParaRPr lang="en-US" dirty="0"/>
           </a:p>
@@ -7776,8 +8100,8 @@
         </p:nvSpPr>
         <p:spPr>
           <a:xfrm>
-            <a:off x="473075" y="1852614"/>
-            <a:ext cx="7464425" cy="4928432"/>
+            <a:off x="473276" y="2595919"/>
+            <a:ext cx="7464425" cy="2198272"/>
           </a:xfrm>
         </p:spPr>
         <p:txBody>
@@ -7786,32 +8110,197 @@
           <a:p>
             <a:r>
               <a:rPr lang="en-US" dirty="0" smtClean="0"/>
-              <a:t>*function and variable definitions*</a:t>
-            </a:r>
-          </a:p>
-          <a:p>
-            <a:r>
-              <a:rPr lang="en-US" dirty="0" smtClean="0"/>
-              <a:t>Algorithms (functions)</a:t>
-            </a:r>
-            <a:endParaRPr lang="en-US" dirty="0"/>
-          </a:p>
-          <a:p>
-            <a:pPr lvl="1"/>
+              <a:t>g – convoluted signal (blurred image)</a:t>
+            </a:r>
+          </a:p>
+          <a:p>
+            <a:r>
+              <a:rPr lang="en-US" dirty="0" smtClean="0"/>
+              <a:t>f – image source </a:t>
+            </a:r>
             <a:r>
               <a:rPr lang="en-US" dirty="0"/>
-              <a:t>Expectation-Maximization (EA)</a:t>
-            </a:r>
-          </a:p>
-          <a:p>
-            <a:pPr lvl="1"/>
-            <a:r>
-              <a:rPr lang="en-US" dirty="0"/>
-              <a:t>Richardson-Lucy (R-L</a:t>
-            </a:r>
-            <a:r>
-              <a:rPr lang="en-US" dirty="0" smtClean="0"/>
-              <a:t>)</a:t>
+              <a:t>(</a:t>
+            </a:r>
+            <a:r>
+              <a:rPr lang="en-US" dirty="0" smtClean="0"/>
+              <a:t>image of ideal clarity) </a:t>
+            </a:r>
+          </a:p>
+          <a:p>
+            <a:r>
+              <a:rPr lang="en-US" dirty="0" smtClean="0"/>
+              <a:t>h – Point Spread Function, PSF (blur of image)</a:t>
+            </a:r>
+          </a:p>
+          <a:p>
+            <a:r>
+              <a:rPr lang="en-US" dirty="0" smtClean="0"/>
+              <a:t>n – additional noise</a:t>
+            </a:r>
+            <a:endParaRPr lang="en-US" dirty="0" smtClean="0"/>
+          </a:p>
+        </p:txBody>
+      </p:sp>
+      <p:pic>
+        <p:nvPicPr>
+          <p:cNvPr id="4" name="Picture 2" descr="generalDeblurProcessRepresentation.PNG"/>
+          <p:cNvPicPr>
+            <a:picLocks noChangeAspect="1" noChangeArrowheads="1"/>
+          </p:cNvPicPr>
+          <p:nvPr/>
+        </p:nvPicPr>
+        <p:blipFill>
+          <a:blip r:embed="rId2">
+            <a:extLst>
+              <a:ext uri="{28A0092B-C50C-407E-A947-70E740481C1C}">
+                <a14:useLocalDpi xmlns:a14="http://schemas.microsoft.com/office/drawing/2010/main" val="0"/>
+              </a:ext>
+            </a:extLst>
+          </a:blip>
+          <a:srcRect/>
+          <a:stretch>
+            <a:fillRect/>
+          </a:stretch>
+        </p:blipFill>
+        <p:spPr bwMode="auto">
+          <a:xfrm>
+            <a:off x="2054626" y="5051128"/>
+            <a:ext cx="4791075" cy="1323975"/>
+          </a:xfrm>
+          <a:prstGeom prst="rect">
+            <a:avLst/>
+          </a:prstGeom>
+          <a:noFill/>
+          <a:extLst>
+            <a:ext uri="{909E8E84-426E-40DD-AFC4-6F175D3DCCD1}">
+              <a14:hiddenFill xmlns:a14="http://schemas.microsoft.com/office/drawing/2010/main">
+                <a:solidFill>
+                  <a:srgbClr val="FFFFFF"/>
+                </a:solidFill>
+              </a14:hiddenFill>
+            </a:ext>
+          </a:extLst>
+        </p:spPr>
+      </p:pic>
+      <p:pic>
+        <p:nvPicPr>
+          <p:cNvPr id="2050" name="Picture 2"/>
+          <p:cNvPicPr>
+            <a:picLocks noChangeAspect="1" noChangeArrowheads="1"/>
+          </p:cNvPicPr>
+          <p:nvPr/>
+        </p:nvPicPr>
+        <p:blipFill>
+          <a:blip r:embed="rId3">
+            <a:extLst>
+              <a:ext uri="{28A0092B-C50C-407E-A947-70E740481C1C}">
+                <a14:useLocalDpi xmlns:a14="http://schemas.microsoft.com/office/drawing/2010/main" val="0"/>
+              </a:ext>
+            </a:extLst>
+          </a:blip>
+          <a:srcRect/>
+          <a:stretch>
+            <a:fillRect/>
+          </a:stretch>
+        </p:blipFill>
+        <p:spPr bwMode="auto">
+          <a:xfrm>
+            <a:off x="3557588" y="1835342"/>
+            <a:ext cx="2028825" cy="885825"/>
+          </a:xfrm>
+          <a:prstGeom prst="rect">
+            <a:avLst/>
+          </a:prstGeom>
+          <a:noFill/>
+          <a:ln>
+            <a:noFill/>
+          </a:ln>
+          <a:effectLst/>
+          <a:extLst>
+            <a:ext uri="{909E8E84-426E-40DD-AFC4-6F175D3DCCD1}">
+              <a14:hiddenFill xmlns:a14="http://schemas.microsoft.com/office/drawing/2010/main">
+                <a:solidFill>
+                  <a:schemeClr val="accent1"/>
+                </a:solidFill>
+              </a14:hiddenFill>
+            </a:ext>
+            <a:ext uri="{91240B29-F687-4F45-9708-019B960494DF}">
+              <a14:hiddenLine xmlns:a14="http://schemas.microsoft.com/office/drawing/2010/main" w="9525">
+                <a:solidFill>
+                  <a:schemeClr val="tx1"/>
+                </a:solidFill>
+                <a:miter lim="800000"/>
+                <a:headEnd/>
+                <a:tailEnd/>
+              </a14:hiddenLine>
+            </a:ext>
+            <a:ext uri="{AF507438-7753-43E0-B8FC-AC1667EBCBE1}">
+              <a14:hiddenEffects xmlns:a14="http://schemas.microsoft.com/office/drawing/2010/main">
+                <a:effectLst>
+                  <a:outerShdw dist="35921" dir="2700000" algn="ctr" rotWithShape="0">
+                    <a:schemeClr val="bg2"/>
+                  </a:outerShdw>
+                </a:effectLst>
+              </a14:hiddenEffects>
+            </a:ext>
+          </a:extLst>
+        </p:spPr>
+      </p:pic>
+      <p:sp>
+        <p:nvSpPr>
+          <p:cNvPr id="9" name="Rectangle 8"/>
+          <p:cNvSpPr/>
+          <p:nvPr/>
+        </p:nvSpPr>
+        <p:spPr>
+          <a:xfrm>
+            <a:off x="5131856" y="6275075"/>
+            <a:ext cx="809837" cy="200055"/>
+          </a:xfrm>
+          <a:prstGeom prst="rect">
+            <a:avLst/>
+          </a:prstGeom>
+        </p:spPr>
+        <p:txBody>
+          <a:bodyPr wrap="none">
+            <a:spAutoFit/>
+          </a:bodyPr>
+          <a:lstStyle/>
+          <a:p>
+            <a:r>
+              <a:rPr lang="en-US" sz="700" dirty="0" smtClean="0"/>
+              <a:t>Source: *insert*</a:t>
+            </a:r>
+            <a:endParaRPr lang="en-US" sz="700" dirty="0"/>
+          </a:p>
+        </p:txBody>
+      </p:sp>
+      <p:sp>
+        <p:nvSpPr>
+          <p:cNvPr id="8" name="TextBox 7"/>
+          <p:cNvSpPr txBox="1"/>
+          <p:nvPr/>
+        </p:nvSpPr>
+        <p:spPr>
+          <a:xfrm>
+            <a:off x="5845323" y="2033899"/>
+            <a:ext cx="2247544" cy="369332"/>
+          </a:xfrm>
+          <a:prstGeom prst="rect">
+            <a:avLst/>
+          </a:prstGeom>
+          <a:noFill/>
+        </p:spPr>
+        <p:txBody>
+          <a:bodyPr wrap="square" rtlCol="0">
+            <a:spAutoFit/>
+          </a:bodyPr>
+          <a:lstStyle/>
+          <a:p>
+            <a:r>
+              <a:rPr lang="en-US" dirty="0" smtClean="0"/>
+              <a:t>Reference(s)?</a:t>
             </a:r>
             <a:endParaRPr lang="en-US" dirty="0"/>
           </a:p>
@@ -7820,13 +8309,20 @@
     </p:spTree>
     <p:extLst>
       <p:ext uri="{BB962C8B-B14F-4D97-AF65-F5344CB8AC3E}">
-        <p14:creationId xmlns:p14="http://schemas.microsoft.com/office/powerpoint/2010/main" val="1409898442"/>
+        <p14:creationId xmlns:p14="http://schemas.microsoft.com/office/powerpoint/2010/main" val="1222160906"/>
       </p:ext>
     </p:extLst>
   </p:cSld>
   <p:clrMapOvr>
     <a:masterClrMapping/>
   </p:clrMapOvr>
+  <p:timing>
+    <p:tnLst>
+      <p:par>
+        <p:cTn id="1" dur="indefinite" restart="never" nodeType="tmRoot"/>
+      </p:par>
+    </p:tnLst>
+  </p:timing>
 </p:sld>
 </file>
 
@@ -7864,7 +8360,7 @@
           <a:p>
             <a:r>
               <a:rPr lang="en-US" dirty="0" smtClean="0"/>
-              <a:t>Results</a:t>
+              <a:t>Model: Algorithms</a:t>
             </a:r>
             <a:endParaRPr lang="en-US" dirty="0"/>
           </a:p>
@@ -7880,42 +8376,101 @@
             <p:ph type="body" sz="quarter" idx="11"/>
           </p:nvPr>
         </p:nvSpPr>
-        <p:spPr/>
+        <p:spPr>
+          <a:xfrm>
+            <a:off x="473075" y="1852614"/>
+            <a:ext cx="7464425" cy="4928432"/>
+          </a:xfrm>
+        </p:spPr>
         <p:txBody>
           <a:bodyPr/>
           <a:lstStyle/>
           <a:p>
             <a:r>
-              <a:rPr lang="en-US" dirty="0" err="1" smtClean="0"/>
-              <a:t>Matlab</a:t>
-            </a:r>
-            <a:r>
-              <a:rPr lang="en-US" dirty="0" smtClean="0"/>
-              <a:t> Implementation </a:t>
-            </a:r>
-          </a:p>
-          <a:p>
-            <a:pPr lvl="1"/>
-            <a:r>
-              <a:rPr lang="en-US" dirty="0" smtClean="0"/>
-              <a:t>Insert </a:t>
-            </a:r>
-            <a:r>
-              <a:rPr lang="en-US" dirty="0" err="1" smtClean="0"/>
-              <a:t>deblurred</a:t>
-            </a:r>
-            <a:r>
-              <a:rPr lang="en-US" dirty="0" smtClean="0"/>
-              <a:t> images</a:t>
+              <a:rPr lang="en-US" dirty="0" smtClean="0"/>
+              <a:t>General:</a:t>
             </a:r>
             <a:endParaRPr lang="en-US" dirty="0"/>
           </a:p>
         </p:txBody>
       </p:sp>
+      <p:sp>
+        <p:nvSpPr>
+          <p:cNvPr id="4" name="Rectangle 3"/>
+          <p:cNvSpPr/>
+          <p:nvPr/>
+        </p:nvSpPr>
+        <p:spPr>
+          <a:xfrm>
+            <a:off x="4653292" y="5694023"/>
+            <a:ext cx="2055371" cy="200055"/>
+          </a:xfrm>
+          <a:prstGeom prst="rect">
+            <a:avLst/>
+          </a:prstGeom>
+        </p:spPr>
+        <p:txBody>
+          <a:bodyPr wrap="none">
+            <a:spAutoFit/>
+          </a:bodyPr>
+          <a:lstStyle/>
+          <a:p>
+            <a:r>
+              <a:rPr lang="en-US" sz="700" dirty="0" smtClean="0"/>
+              <a:t>Source: http</a:t>
+            </a:r>
+            <a:r>
+              <a:rPr lang="en-US" sz="700" dirty="0"/>
+              <a:t>://jacobwinick.me/imagedeblurring/</a:t>
+            </a:r>
+          </a:p>
+        </p:txBody>
+      </p:sp>
+      <p:pic>
+        <p:nvPicPr>
+          <p:cNvPr id="3074" name="Picture 2" descr="http://jacobwinick.me/imagedeblurring/img_plot/ayers_dainty.jpg"/>
+          <p:cNvPicPr>
+            <a:picLocks noChangeAspect="1" noChangeArrowheads="1"/>
+          </p:cNvPicPr>
+          <p:nvPr/>
+        </p:nvPicPr>
+        <p:blipFill>
+          <a:blip r:embed="rId2">
+            <a:extLst>
+              <a:ext uri="{28A0092B-C50C-407E-A947-70E740481C1C}">
+                <a14:useLocalDpi xmlns:a14="http://schemas.microsoft.com/office/drawing/2010/main" val="0"/>
+              </a:ext>
+            </a:extLst>
+          </a:blip>
+          <a:srcRect/>
+          <a:stretch>
+            <a:fillRect/>
+          </a:stretch>
+        </p:blipFill>
+        <p:spPr bwMode="auto">
+          <a:xfrm>
+            <a:off x="2597921" y="1731957"/>
+            <a:ext cx="3715877" cy="4002272"/>
+          </a:xfrm>
+          <a:prstGeom prst="rect">
+            <a:avLst/>
+          </a:prstGeom>
+          <a:noFill/>
+          <a:extLst>
+            <a:ext uri="{909E8E84-426E-40DD-AFC4-6F175D3DCCD1}">
+              <a14:hiddenFill xmlns:a14="http://schemas.microsoft.com/office/drawing/2010/main">
+                <a:solidFill>
+                  <a:srgbClr val="FFFFFF"/>
+                </a:solidFill>
+              </a14:hiddenFill>
+            </a:ext>
+          </a:extLst>
+        </p:spPr>
+      </p:pic>
     </p:spTree>
     <p:extLst>
       <p:ext uri="{BB962C8B-B14F-4D97-AF65-F5344CB8AC3E}">
-        <p14:creationId xmlns:p14="http://schemas.microsoft.com/office/powerpoint/2010/main" val="963608606"/>
+        <p14:creationId xmlns:p14="http://schemas.microsoft.com/office/powerpoint/2010/main" val="1409898442"/>
       </p:ext>
     </p:extLst>
   </p:cSld>
@@ -7959,8 +8514,11 @@
           <a:p>
             <a:r>
               <a:rPr lang="en-US" dirty="0" smtClean="0"/>
-              <a:t>Summary/Conclusions</a:t>
-            </a:r>
+              <a:t>Model: Algorithms (cont.)</a:t>
+            </a:r>
+            <a:endParaRPr lang="en-US" dirty="0"/>
+          </a:p>
+          <a:p>
             <a:endParaRPr lang="en-US" dirty="0"/>
           </a:p>
         </p:txBody>
@@ -7982,70 +8540,151 @@
           <a:p>
             <a:r>
               <a:rPr lang="en-US" dirty="0" smtClean="0"/>
-              <a:t>Summary</a:t>
+              <a:t>Maximum Likelihood Estimation (Holmes)</a:t>
             </a:r>
             <a:endParaRPr lang="en-US" dirty="0"/>
           </a:p>
           <a:p>
-            <a:pPr lvl="1"/>
-            <a:r>
-              <a:rPr lang="en-US" dirty="0" smtClean="0"/>
-              <a:t>Image </a:t>
-            </a:r>
-            <a:r>
-              <a:rPr lang="en-US" dirty="0" err="1" smtClean="0"/>
-              <a:t>deblurring</a:t>
-            </a:r>
-            <a:r>
-              <a:rPr lang="en-US" dirty="0" smtClean="0"/>
-              <a:t> and significance</a:t>
-            </a:r>
-          </a:p>
-          <a:p>
-            <a:pPr lvl="1"/>
-            <a:r>
-              <a:rPr lang="en-US" dirty="0" smtClean="0"/>
-              <a:t>How Matrix Theory is instrumental to this application</a:t>
-            </a:r>
-          </a:p>
-          <a:p>
-            <a:r>
-              <a:rPr lang="en-US" dirty="0" smtClean="0"/>
-              <a:t>Conclusions</a:t>
-            </a:r>
-          </a:p>
-          <a:p>
-            <a:pPr lvl="1"/>
-            <a:r>
-              <a:rPr lang="en-US" dirty="0" smtClean="0"/>
-              <a:t>Able to replicate results and therefore demonstrate the </a:t>
-            </a:r>
-            <a:r>
-              <a:rPr lang="en-US" dirty="0" smtClean="0"/>
-              <a:t>application</a:t>
-            </a:r>
-          </a:p>
-          <a:p>
-            <a:pPr lvl="1"/>
+            <a:r>
+              <a:rPr lang="en-US" dirty="0" smtClean="0"/>
+              <a:t>Richardson-Lucy algorithm (Biggs)</a:t>
+            </a:r>
             <a:endParaRPr lang="en-US" dirty="0"/>
           </a:p>
-          <a:p>
-            <a:r>
-              <a:rPr lang="en-US" dirty="0" smtClean="0"/>
-              <a:t>Emphasize relevance to real world, can use cheaper cameras, tackle challenging observation environment, fix pics that have </a:t>
-            </a:r>
-            <a:r>
-              <a:rPr lang="en-US" smtClean="0"/>
-              <a:t>already been taken a long time ago…</a:t>
-            </a:r>
-            <a:endParaRPr lang="en-US" dirty="0" smtClean="0"/>
-          </a:p>
-        </p:txBody>
-      </p:sp>
+        </p:txBody>
+      </p:sp>
+      <p:pic>
+        <p:nvPicPr>
+          <p:cNvPr id="4098" name="Picture 2"/>
+          <p:cNvPicPr>
+            <a:picLocks noChangeAspect="1" noChangeArrowheads="1"/>
+          </p:cNvPicPr>
+          <p:nvPr/>
+        </p:nvPicPr>
+        <p:blipFill>
+          <a:blip r:embed="rId2">
+            <a:extLst>
+              <a:ext uri="{28A0092B-C50C-407E-A947-70E740481C1C}">
+                <a14:useLocalDpi xmlns:a14="http://schemas.microsoft.com/office/drawing/2010/main" val="0"/>
+              </a:ext>
+            </a:extLst>
+          </a:blip>
+          <a:srcRect/>
+          <a:stretch>
+            <a:fillRect/>
+          </a:stretch>
+        </p:blipFill>
+        <p:spPr bwMode="auto">
+          <a:xfrm>
+            <a:off x="2976562" y="3072700"/>
+            <a:ext cx="3190875" cy="1152525"/>
+          </a:xfrm>
+          <a:prstGeom prst="rect">
+            <a:avLst/>
+          </a:prstGeom>
+          <a:noFill/>
+          <a:ln>
+            <a:noFill/>
+          </a:ln>
+          <a:effectLst/>
+          <a:extLst>
+            <a:ext uri="{909E8E84-426E-40DD-AFC4-6F175D3DCCD1}">
+              <a14:hiddenFill xmlns:a14="http://schemas.microsoft.com/office/drawing/2010/main">
+                <a:solidFill>
+                  <a:schemeClr val="accent1"/>
+                </a:solidFill>
+              </a14:hiddenFill>
+            </a:ext>
+            <a:ext uri="{91240B29-F687-4F45-9708-019B960494DF}">
+              <a14:hiddenLine xmlns:a14="http://schemas.microsoft.com/office/drawing/2010/main" w="9525">
+                <a:solidFill>
+                  <a:schemeClr val="tx1"/>
+                </a:solidFill>
+                <a:miter lim="800000"/>
+                <a:headEnd/>
+                <a:tailEnd/>
+              </a14:hiddenLine>
+            </a:ext>
+            <a:ext uri="{AF507438-7753-43E0-B8FC-AC1667EBCBE1}">
+              <a14:hiddenEffects xmlns:a14="http://schemas.microsoft.com/office/drawing/2010/main">
+                <a:effectLst>
+                  <a:outerShdw dist="35921" dir="2700000" algn="ctr" rotWithShape="0">
+                    <a:schemeClr val="bg2"/>
+                  </a:outerShdw>
+                </a:effectLst>
+              </a14:hiddenEffects>
+            </a:ext>
+          </a:extLst>
+        </p:spPr>
+      </p:pic>
+      <p:pic>
+        <p:nvPicPr>
+          <p:cNvPr id="4099" name="Picture 3"/>
+          <p:cNvPicPr>
+            <a:picLocks noChangeAspect="1" noChangeArrowheads="1"/>
+          </p:cNvPicPr>
+          <p:nvPr/>
+        </p:nvPicPr>
+        <p:blipFill>
+          <a:blip r:embed="rId3">
+            <a:extLst>
+              <a:ext uri="{28A0092B-C50C-407E-A947-70E740481C1C}">
+                <a14:useLocalDpi xmlns:a14="http://schemas.microsoft.com/office/drawing/2010/main" val="0"/>
+              </a:ext>
+            </a:extLst>
+          </a:blip>
+          <a:srcRect/>
+          <a:stretch>
+            <a:fillRect/>
+          </a:stretch>
+        </p:blipFill>
+        <p:spPr bwMode="auto">
+          <a:xfrm>
+            <a:off x="3028950" y="4387019"/>
+            <a:ext cx="3086100" cy="866775"/>
+          </a:xfrm>
+          <a:prstGeom prst="rect">
+            <a:avLst/>
+          </a:prstGeom>
+          <a:noFill/>
+          <a:ln>
+            <a:noFill/>
+          </a:ln>
+          <a:effectLst/>
+          <a:extLst>
+            <a:ext uri="{909E8E84-426E-40DD-AFC4-6F175D3DCCD1}">
+              <a14:hiddenFill xmlns:a14="http://schemas.microsoft.com/office/drawing/2010/main">
+                <a:solidFill>
+                  <a:schemeClr val="accent1"/>
+                </a:solidFill>
+              </a14:hiddenFill>
+            </a:ext>
+            <a:ext uri="{91240B29-F687-4F45-9708-019B960494DF}">
+              <a14:hiddenLine xmlns:a14="http://schemas.microsoft.com/office/drawing/2010/main" w="9525">
+                <a:solidFill>
+                  <a:schemeClr val="tx1"/>
+                </a:solidFill>
+                <a:miter lim="800000"/>
+                <a:headEnd/>
+                <a:tailEnd/>
+              </a14:hiddenLine>
+            </a:ext>
+            <a:ext uri="{AF507438-7753-43E0-B8FC-AC1667EBCBE1}">
+              <a14:hiddenEffects xmlns:a14="http://schemas.microsoft.com/office/drawing/2010/main">
+                <a:effectLst>
+                  <a:outerShdw dist="35921" dir="2700000" algn="ctr" rotWithShape="0">
+                    <a:schemeClr val="bg2"/>
+                  </a:outerShdw>
+                </a:effectLst>
+              </a14:hiddenEffects>
+            </a:ext>
+          </a:extLst>
+        </p:spPr>
+      </p:pic>
     </p:spTree>
     <p:extLst>
       <p:ext uri="{BB962C8B-B14F-4D97-AF65-F5344CB8AC3E}">
-        <p14:creationId xmlns:p14="http://schemas.microsoft.com/office/powerpoint/2010/main" val="3396068983"/>
+        <p14:creationId xmlns:p14="http://schemas.microsoft.com/office/powerpoint/2010/main" val="3511616225"/>
       </p:ext>
     </p:extLst>
   </p:cSld>
@@ -8082,11 +8721,28 @@
             <p:ph type="body" sz="quarter" idx="10"/>
           </p:nvPr>
         </p:nvSpPr>
-        <p:spPr/>
+        <p:spPr>
+          <a:xfrm>
+            <a:off x="200562" y="712807"/>
+            <a:ext cx="7200096" cy="664714"/>
+          </a:xfrm>
+        </p:spPr>
         <p:txBody>
           <a:bodyPr/>
           <a:lstStyle/>
           <a:p>
+            <a:r>
+              <a:rPr lang="en-US" dirty="0" smtClean="0"/>
+              <a:t>Results: </a:t>
+            </a:r>
+            <a:r>
+              <a:rPr lang="en-US" dirty="0" err="1" smtClean="0"/>
+              <a:t>Matlab</a:t>
+            </a:r>
+            <a:r>
+              <a:rPr lang="en-US" dirty="0" smtClean="0"/>
+              <a:t> Implementation</a:t>
+            </a:r>
             <a:endParaRPr lang="en-US" dirty="0"/>
           </a:p>
         </p:txBody>
@@ -8106,30 +8762,29 @@
           <a:bodyPr/>
           <a:lstStyle/>
           <a:p>
-            <a:pPr marL="0" indent="0" algn="ctr">
-              <a:buNone/>
-            </a:pPr>
-            <a:endParaRPr lang="en-US" sz="11500" dirty="0" smtClean="0"/>
-          </a:p>
-          <a:p>
-            <a:pPr marL="0" indent="0" algn="ctr">
-              <a:buNone/>
-            </a:pPr>
-            <a:endParaRPr lang="en-US" sz="11500" dirty="0"/>
-          </a:p>
-          <a:p>
-            <a:pPr marL="0" indent="0" algn="ctr">
-              <a:buNone/>
-            </a:pPr>
-            <a:endParaRPr lang="en-US" sz="11500" dirty="0" smtClean="0"/>
-          </a:p>
-          <a:p>
-            <a:pPr marL="0" indent="0" algn="ctr">
-              <a:buNone/>
-            </a:pPr>
-            <a:r>
-              <a:rPr lang="en-US" sz="11500" dirty="0" smtClean="0"/>
-              <a:t>BACKUP</a:t>
+            <a:pPr lvl="1"/>
+            <a:r>
+              <a:rPr lang="en-US" dirty="0" smtClean="0"/>
+              <a:t>*blip of code*</a:t>
+            </a:r>
+          </a:p>
+          <a:p>
+            <a:pPr lvl="1"/>
+            <a:endParaRPr lang="en-US" dirty="0" smtClean="0"/>
+          </a:p>
+          <a:p>
+            <a:pPr lvl="1"/>
+            <a:endParaRPr lang="en-US" smtClean="0"/>
+          </a:p>
+          <a:p>
+            <a:pPr lvl="1"/>
+            <a:r>
+              <a:rPr lang="en-US" smtClean="0"/>
+              <a:t>*</a:t>
+            </a:r>
+            <a:r>
+              <a:rPr lang="en-US" dirty="0" smtClean="0"/>
+              <a:t>image comparison*</a:t>
             </a:r>
             <a:endParaRPr lang="en-US" dirty="0"/>
           </a:p>
@@ -8138,7 +8793,7 @@
     </p:spTree>
     <p:extLst>
       <p:ext uri="{BB962C8B-B14F-4D97-AF65-F5344CB8AC3E}">
-        <p14:creationId xmlns:p14="http://schemas.microsoft.com/office/powerpoint/2010/main" val="2262790281"/>
+        <p14:creationId xmlns:p14="http://schemas.microsoft.com/office/powerpoint/2010/main" val="963608606"/>
       </p:ext>
     </p:extLst>
   </p:cSld>

</xml_diff>

<commit_message>
updated ppt and script
</commit_message>
<xml_diff>
--- a/Presentation/Diederich_Grassi_Nichols_PPT.pptx
+++ b/Presentation/Diederich_Grassi_Nichols_PPT.pptx
@@ -8771,30 +8771,94 @@
             <p:ph type="body" sz="quarter" idx="11"/>
           </p:nvPr>
         </p:nvSpPr>
-        <p:spPr/>
+        <p:spPr>
+          <a:xfrm>
+            <a:off x="473075" y="1632178"/>
+            <a:ext cx="7464425" cy="3121554"/>
+          </a:xfrm>
+        </p:spPr>
         <p:txBody>
           <a:bodyPr/>
           <a:lstStyle/>
           <a:p>
             <a:pPr lvl="1"/>
             <a:r>
-              <a:rPr lang="en-US" dirty="0" err="1">
+              <a:rPr lang="en-US" sz="1600" dirty="0" err="1">
                 <a:hlinkClick r:id="rId2"/>
               </a:rPr>
               <a:t>d</a:t>
             </a:r>
             <a:r>
-              <a:rPr lang="en-US" dirty="0" err="1" smtClean="0">
+              <a:rPr lang="en-US" sz="1600" dirty="0" err="1" smtClean="0">
                 <a:hlinkClick r:id="rId2"/>
               </a:rPr>
               <a:t>econvblind</a:t>
             </a:r>
             <a:r>
-              <a:rPr lang="en-US" dirty="0" smtClean="0">
+              <a:rPr lang="en-US" sz="1600" dirty="0" smtClean="0">
                 <a:hlinkClick r:id="rId2"/>
               </a:rPr>
-              <a:t> documentation</a:t>
-            </a:r>
+              <a:t> </a:t>
+            </a:r>
+            <a:r>
+              <a:rPr lang="en-US" sz="1600" dirty="0" smtClean="0">
+                <a:hlinkClick r:id="rId2"/>
+              </a:rPr>
+              <a:t>documentation</a:t>
+            </a:r>
+            <a:endParaRPr lang="en-US" sz="1600" dirty="0" smtClean="0"/>
+          </a:p>
+          <a:p>
+            <a:pPr lvl="1"/>
+            <a:endParaRPr lang="en-US" sz="1600" dirty="0" smtClean="0"/>
+          </a:p>
+          <a:p>
+            <a:pPr lvl="1"/>
+            <a:r>
+              <a:rPr lang="en-US" sz="1600" dirty="0" smtClean="0"/>
+              <a:t>[</a:t>
+            </a:r>
+            <a:r>
+              <a:rPr lang="en-US" sz="1600" dirty="0"/>
+              <a:t>J, P] = </a:t>
+            </a:r>
+            <a:r>
+              <a:rPr lang="en-US" sz="1600" dirty="0" err="1"/>
+              <a:t>deconvblind</a:t>
+            </a:r>
+            <a:r>
+              <a:rPr lang="en-US" sz="1600" dirty="0"/>
+              <a:t>(blurred(:,:,1),INITPSF,20,[],WEIGHT);</a:t>
+            </a:r>
+          </a:p>
+          <a:p>
+            <a:pPr marL="287337" lvl="1" indent="0">
+              <a:buNone/>
+            </a:pPr>
+            <a:endParaRPr lang="en-US" sz="1600" dirty="0" smtClean="0"/>
+          </a:p>
+          <a:p>
+            <a:pPr marL="287337" lvl="1" indent="0">
+              <a:buNone/>
+            </a:pPr>
+            <a:endParaRPr lang="en-US" dirty="0"/>
+          </a:p>
+          <a:p>
+            <a:pPr marL="287337" lvl="1" indent="0">
+              <a:buNone/>
+            </a:pPr>
+            <a:endParaRPr lang="en-US" dirty="0"/>
+          </a:p>
+          <a:p>
+            <a:pPr marL="287337" lvl="1" indent="0">
+              <a:buNone/>
+            </a:pPr>
+            <a:endParaRPr lang="en-US" dirty="0"/>
+          </a:p>
+          <a:p>
+            <a:pPr marL="287337" lvl="1" indent="0">
+              <a:buNone/>
+            </a:pPr>
             <a:endParaRPr lang="en-US" dirty="0" smtClean="0"/>
           </a:p>
           <a:p>
@@ -8803,13 +8867,12 @@
           </a:p>
           <a:p>
             <a:pPr lvl="1"/>
-            <a:r>
-              <a:rPr lang="en-US" dirty="0" smtClean="0"/>
-              <a:t>*blip of code*</a:t>
-            </a:r>
-          </a:p>
-          <a:p>
-            <a:pPr lvl="1"/>
+            <a:endParaRPr lang="en-US" dirty="0" smtClean="0"/>
+          </a:p>
+          <a:p>
+            <a:pPr marL="287337" lvl="1" indent="0">
+              <a:buNone/>
+            </a:pPr>
             <a:endParaRPr lang="en-US" dirty="0" smtClean="0"/>
           </a:p>
           <a:p>
@@ -8818,73 +8881,172 @@
           </a:p>
           <a:p>
             <a:pPr lvl="1"/>
-            <a:endParaRPr lang="en-US" dirty="0" smtClean="0"/>
-          </a:p>
-          <a:p>
-            <a:pPr lvl="1"/>
-            <a:r>
-              <a:rPr lang="en-US" dirty="0" smtClean="0"/>
-              <a:t>*image comparison*</a:t>
-            </a:r>
-          </a:p>
-          <a:p>
-            <a:pPr lvl="1"/>
-            <a:endParaRPr lang="en-US" dirty="0" smtClean="0"/>
-          </a:p>
-          <a:p>
-            <a:pPr lvl="1"/>
-            <a:endParaRPr lang="en-US" dirty="0"/>
-          </a:p>
-          <a:p>
-            <a:pPr lvl="1"/>
-            <a:endParaRPr lang="en-US" dirty="0"/>
-          </a:p>
-          <a:p>
-            <a:pPr lvl="1"/>
-            <a:r>
-              <a:rPr lang="en-US" dirty="0" smtClean="0"/>
+            <a:r>
+              <a:rPr lang="en-US" sz="1600" dirty="0" smtClean="0"/>
               <a:t>Do it yourself: </a:t>
             </a:r>
             <a:r>
-              <a:rPr lang="en-US" dirty="0" smtClean="0">
+              <a:rPr lang="en-US" sz="1600" dirty="0" smtClean="0">
                 <a:hlinkClick r:id="rId3"/>
               </a:rPr>
               <a:t>How to </a:t>
             </a:r>
             <a:r>
-              <a:rPr lang="en-US" dirty="0" err="1" smtClean="0">
+              <a:rPr lang="en-US" sz="1600" dirty="0" err="1" smtClean="0">
                 <a:hlinkClick r:id="rId3"/>
               </a:rPr>
               <a:t>deblur</a:t>
             </a:r>
             <a:r>
-              <a:rPr lang="en-US" dirty="0" smtClean="0">
+              <a:rPr lang="en-US" sz="1600" dirty="0" smtClean="0">
                 <a:hlinkClick r:id="rId3"/>
               </a:rPr>
-              <a:t> using the blind </a:t>
-            </a:r>
-            <a:r>
-              <a:rPr lang="en-US" dirty="0" err="1" smtClean="0">
+              <a:t> using </a:t>
+            </a:r>
+            <a:r>
+              <a:rPr lang="en-US" sz="1600" dirty="0" smtClean="0">
                 <a:hlinkClick r:id="rId3"/>
               </a:rPr>
-              <a:t>econvolution</a:t>
-            </a:r>
-            <a:r>
-              <a:rPr lang="en-US" dirty="0" smtClean="0">
+              <a:t>the </a:t>
+            </a:r>
+            <a:r>
+              <a:rPr lang="en-US" sz="1600" dirty="0" err="1" smtClean="0">
+                <a:hlinkClick r:id="rId3"/>
+              </a:rPr>
+              <a:t>deconvblind</a:t>
+            </a:r>
+            <a:r>
+              <a:rPr lang="en-US" sz="1600" dirty="0" smtClean="0">
                 <a:hlinkClick r:id="rId3"/>
               </a:rPr>
               <a:t> algorithm in </a:t>
             </a:r>
             <a:r>
-              <a:rPr lang="en-US" dirty="0" err="1" smtClean="0">
+              <a:rPr lang="en-US" sz="1600" dirty="0" err="1" smtClean="0">
                 <a:hlinkClick r:id="rId3"/>
               </a:rPr>
               <a:t>matlab</a:t>
             </a:r>
-            <a:endParaRPr lang="en-US" dirty="0"/>
-          </a:p>
-        </p:txBody>
-      </p:sp>
+            <a:endParaRPr lang="en-US" sz="1600" dirty="0"/>
+          </a:p>
+        </p:txBody>
+      </p:sp>
+      <p:pic>
+        <p:nvPicPr>
+          <p:cNvPr id="4" name="Picture 3"/>
+          <p:cNvPicPr>
+            <a:picLocks noChangeAspect="1"/>
+          </p:cNvPicPr>
+          <p:nvPr/>
+        </p:nvPicPr>
+        <p:blipFill rotWithShape="1">
+          <a:blip r:embed="rId4">
+            <a:extLst>
+              <a:ext uri="{28A0092B-C50C-407E-A947-70E740481C1C}">
+                <a14:useLocalDpi xmlns:a14="http://schemas.microsoft.com/office/drawing/2010/main" val="0"/>
+              </a:ext>
+            </a:extLst>
+          </a:blip>
+          <a:srcRect l="26237" t="12689" r="26681" b="30410"/>
+          <a:stretch/>
+        </p:blipFill>
+        <p:spPr>
+          <a:xfrm>
+            <a:off x="24041" y="2785679"/>
+            <a:ext cx="2285410" cy="2457893"/>
+          </a:xfrm>
+          <a:prstGeom prst="rect">
+            <a:avLst/>
+          </a:prstGeom>
+        </p:spPr>
+      </p:pic>
+      <p:pic>
+        <p:nvPicPr>
+          <p:cNvPr id="5" name="Picture 4"/>
+          <p:cNvPicPr>
+            <a:picLocks noChangeAspect="1"/>
+          </p:cNvPicPr>
+          <p:nvPr/>
+        </p:nvPicPr>
+        <p:blipFill rotWithShape="1">
+          <a:blip r:embed="rId5">
+            <a:extLst>
+              <a:ext uri="{28A0092B-C50C-407E-A947-70E740481C1C}">
+                <a14:useLocalDpi xmlns:a14="http://schemas.microsoft.com/office/drawing/2010/main" val="0"/>
+              </a:ext>
+            </a:extLst>
+          </a:blip>
+          <a:srcRect l="27571" t="8847" r="28046" b="26202"/>
+          <a:stretch/>
+        </p:blipFill>
+        <p:spPr>
+          <a:xfrm>
+            <a:off x="4603025" y="2844176"/>
+            <a:ext cx="2305570" cy="2438869"/>
+          </a:xfrm>
+          <a:prstGeom prst="rect">
+            <a:avLst/>
+          </a:prstGeom>
+        </p:spPr>
+      </p:pic>
+      <p:pic>
+        <p:nvPicPr>
+          <p:cNvPr id="6" name="Picture 5"/>
+          <p:cNvPicPr>
+            <a:picLocks noChangeAspect="1"/>
+          </p:cNvPicPr>
+          <p:nvPr/>
+        </p:nvPicPr>
+        <p:blipFill rotWithShape="1">
+          <a:blip r:embed="rId6">
+            <a:extLst>
+              <a:ext uri="{28A0092B-C50C-407E-A947-70E740481C1C}">
+                <a14:useLocalDpi xmlns:a14="http://schemas.microsoft.com/office/drawing/2010/main" val="0"/>
+              </a:ext>
+            </a:extLst>
+          </a:blip>
+          <a:srcRect l="26095" t="12974" r="26651" b="30420"/>
+          <a:stretch/>
+        </p:blipFill>
+        <p:spPr>
+          <a:xfrm>
+            <a:off x="6903800" y="2883651"/>
+            <a:ext cx="2223872" cy="2359921"/>
+          </a:xfrm>
+          <a:prstGeom prst="rect">
+            <a:avLst/>
+          </a:prstGeom>
+        </p:spPr>
+      </p:pic>
+      <p:pic>
+        <p:nvPicPr>
+          <p:cNvPr id="7" name="Picture 6"/>
+          <p:cNvPicPr>
+            <a:picLocks noChangeAspect="1"/>
+          </p:cNvPicPr>
+          <p:nvPr/>
+        </p:nvPicPr>
+        <p:blipFill rotWithShape="1">
+          <a:blip r:embed="rId7">
+            <a:extLst>
+              <a:ext uri="{28A0092B-C50C-407E-A947-70E740481C1C}">
+                <a14:useLocalDpi xmlns:a14="http://schemas.microsoft.com/office/drawing/2010/main" val="0"/>
+              </a:ext>
+            </a:extLst>
+          </a:blip>
+          <a:srcRect l="26125" t="13153" r="26681" b="30448"/>
+          <a:stretch/>
+        </p:blipFill>
+        <p:spPr>
+          <a:xfrm>
+            <a:off x="2309451" y="2823725"/>
+            <a:ext cx="2285410" cy="2419847"/>
+          </a:xfrm>
+          <a:prstGeom prst="rect">
+            <a:avLst/>
+          </a:prstGeom>
+        </p:spPr>
+      </p:pic>
     </p:spTree>
     <p:extLst>
       <p:ext uri="{BB962C8B-B14F-4D97-AF65-F5344CB8AC3E}">

</xml_diff>